<commit_message>
Added new changes to Presentation
</commit_message>
<xml_diff>
--- a/Presentation/Week 14 Presentation.pptx
+++ b/Presentation/Week 14 Presentation.pptx
@@ -2,7 +2,7 @@
 <file path=ppt/presentation.xml><?xml version="1.0" encoding="utf-8"?>
 <p:presentation xmlns:a="http://schemas.openxmlformats.org/drawingml/2006/main" xmlns:r="http://schemas.openxmlformats.org/officeDocument/2006/relationships" xmlns:p="http://schemas.openxmlformats.org/presentationml/2006/main" saveSubsetFonts="1">
   <p:sldMasterIdLst>
-    <p:sldMasterId id="2147483648" r:id="rId4"/>
+    <p:sldMasterId id="2147483660" r:id="rId4"/>
   </p:sldMasterIdLst>
   <p:sldIdLst>
     <p:sldId id="256" r:id="rId5"/>
@@ -12,6 +12,8 @@
     <p:sldId id="260" r:id="rId9"/>
     <p:sldId id="261" r:id="rId10"/>
     <p:sldId id="262" r:id="rId11"/>
+    <p:sldId id="263" r:id="rId12"/>
+    <p:sldId id="264" r:id="rId13"/>
   </p:sldIdLst>
   <p:sldSz cx="12192000" cy="6858000"/>
   <p:notesSz cx="6858000" cy="9144000"/>
@@ -19,7 +21,7 @@
     <a:defPPr>
       <a:defRPr lang="en-US"/>
     </a:defPPr>
-    <a:lvl1pPr marL="0" algn="l" defTabSz="914400" rtl="0" eaLnBrk="1" latinLnBrk="0" hangingPunct="1">
+    <a:lvl1pPr marL="0" algn="l" defTabSz="457200" rtl="0" eaLnBrk="1" latinLnBrk="0" hangingPunct="1">
       <a:defRPr sz="1800" kern="1200">
         <a:solidFill>
           <a:schemeClr val="tx1"/>
@@ -29,7 +31,7 @@
         <a:cs typeface="+mn-cs"/>
       </a:defRPr>
     </a:lvl1pPr>
-    <a:lvl2pPr marL="457200" algn="l" defTabSz="914400" rtl="0" eaLnBrk="1" latinLnBrk="0" hangingPunct="1">
+    <a:lvl2pPr marL="457200" algn="l" defTabSz="457200" rtl="0" eaLnBrk="1" latinLnBrk="0" hangingPunct="1">
       <a:defRPr sz="1800" kern="1200">
         <a:solidFill>
           <a:schemeClr val="tx1"/>
@@ -39,7 +41,7 @@
         <a:cs typeface="+mn-cs"/>
       </a:defRPr>
     </a:lvl2pPr>
-    <a:lvl3pPr marL="914400" algn="l" defTabSz="914400" rtl="0" eaLnBrk="1" latinLnBrk="0" hangingPunct="1">
+    <a:lvl3pPr marL="914400" algn="l" defTabSz="457200" rtl="0" eaLnBrk="1" latinLnBrk="0" hangingPunct="1">
       <a:defRPr sz="1800" kern="1200">
         <a:solidFill>
           <a:schemeClr val="tx1"/>
@@ -49,7 +51,7 @@
         <a:cs typeface="+mn-cs"/>
       </a:defRPr>
     </a:lvl3pPr>
-    <a:lvl4pPr marL="1371600" algn="l" defTabSz="914400" rtl="0" eaLnBrk="1" latinLnBrk="0" hangingPunct="1">
+    <a:lvl4pPr marL="1371600" algn="l" defTabSz="457200" rtl="0" eaLnBrk="1" latinLnBrk="0" hangingPunct="1">
       <a:defRPr sz="1800" kern="1200">
         <a:solidFill>
           <a:schemeClr val="tx1"/>
@@ -59,7 +61,7 @@
         <a:cs typeface="+mn-cs"/>
       </a:defRPr>
     </a:lvl4pPr>
-    <a:lvl5pPr marL="1828800" algn="l" defTabSz="914400" rtl="0" eaLnBrk="1" latinLnBrk="0" hangingPunct="1">
+    <a:lvl5pPr marL="1828800" algn="l" defTabSz="457200" rtl="0" eaLnBrk="1" latinLnBrk="0" hangingPunct="1">
       <a:defRPr sz="1800" kern="1200">
         <a:solidFill>
           <a:schemeClr val="tx1"/>
@@ -69,7 +71,7 @@
         <a:cs typeface="+mn-cs"/>
       </a:defRPr>
     </a:lvl5pPr>
-    <a:lvl6pPr marL="2286000" algn="l" defTabSz="914400" rtl="0" eaLnBrk="1" latinLnBrk="0" hangingPunct="1">
+    <a:lvl6pPr marL="2286000" algn="l" defTabSz="457200" rtl="0" eaLnBrk="1" latinLnBrk="0" hangingPunct="1">
       <a:defRPr sz="1800" kern="1200">
         <a:solidFill>
           <a:schemeClr val="tx1"/>
@@ -79,7 +81,7 @@
         <a:cs typeface="+mn-cs"/>
       </a:defRPr>
     </a:lvl6pPr>
-    <a:lvl7pPr marL="2743200" algn="l" defTabSz="914400" rtl="0" eaLnBrk="1" latinLnBrk="0" hangingPunct="1">
+    <a:lvl7pPr marL="2743200" algn="l" defTabSz="457200" rtl="0" eaLnBrk="1" latinLnBrk="0" hangingPunct="1">
       <a:defRPr sz="1800" kern="1200">
         <a:solidFill>
           <a:schemeClr val="tx1"/>
@@ -89,7 +91,7 @@
         <a:cs typeface="+mn-cs"/>
       </a:defRPr>
     </a:lvl7pPr>
-    <a:lvl8pPr marL="3200400" algn="l" defTabSz="914400" rtl="0" eaLnBrk="1" latinLnBrk="0" hangingPunct="1">
+    <a:lvl8pPr marL="3200400" algn="l" defTabSz="457200" rtl="0" eaLnBrk="1" latinLnBrk="0" hangingPunct="1">
       <a:defRPr sz="1800" kern="1200">
         <a:solidFill>
           <a:schemeClr val="tx1"/>
@@ -99,7 +101,7 @@
         <a:cs typeface="+mn-cs"/>
       </a:defRPr>
     </a:lvl8pPr>
-    <a:lvl9pPr marL="3657600" algn="l" defTabSz="914400" rtl="0" eaLnBrk="1" latinLnBrk="0" hangingPunct="1">
+    <a:lvl9pPr marL="3657600" algn="l" defTabSz="457200" rtl="0" eaLnBrk="1" latinLnBrk="0" hangingPunct="1">
       <a:defRPr sz="1800" kern="1200">
         <a:solidFill>
           <a:schemeClr val="tx1"/>
@@ -110,7 +112,20 @@
       </a:defRPr>
     </a:lvl9pPr>
   </p:defaultTextStyle>
+  <p:extLst>
+    <p:ext uri="{EFAFB233-063F-42B5-8137-9DF3F51BA10A}">
+      <p15:sldGuideLst xmlns:p15="http://schemas.microsoft.com/office/powerpoint/2012/main"/>
+    </p:ext>
+  </p:extLst>
 </p:presentation>
+</file>
+
+<file path=ppt/revisionInfo.xml><?xml version="1.0" encoding="utf-8"?>
+<p1510:revInfo xmlns:a="http://schemas.openxmlformats.org/drawingml/2006/main" xmlns:r="http://schemas.openxmlformats.org/officeDocument/2006/relationships" xmlns:p1510="http://schemas.microsoft.com/office/powerpoint/2015/10/main">
+  <p1510:revLst>
+    <p1510:client id="{1972D1C9-41F4-40BD-BDB6-A6DDB144804A}" v="1257" dt="2025-11-24T21:42:26.265"/>
+  </p1510:revLst>
+</p1510:revInfo>
 </file>
 
 <file path=ppt/slideLayouts/slideLayout1.xml><?xml version="1.0" encoding="utf-8"?>
@@ -132,13 +147,7 @@
       </p:grpSpPr>
       <p:sp>
         <p:nvSpPr>
-          <p:cNvPr id="2" name="Title 1">
-            <a:extLst>
-              <a:ext uri="{FF2B5EF4-FFF2-40B4-BE49-F238E27FC236}">
-                <a16:creationId xmlns:a16="http://schemas.microsoft.com/office/drawing/2014/main" id="{2EABB5D4-C6C9-A92C-1E4D-D62A4DD2E817}"/>
-              </a:ext>
-            </a:extLst>
-          </p:cNvPr>
+          <p:cNvPr id="2" name="Title 1"/>
           <p:cNvSpPr>
             <a:spLocks noGrp="1"/>
           </p:cNvSpPr>
@@ -164,18 +173,13 @@
               <a:rPr lang="en-US"/>
               <a:t>Click to edit Master title style</a:t>
             </a:r>
-          </a:p>
-        </p:txBody>
-      </p:sp>
-      <p:sp>
-        <p:nvSpPr>
-          <p:cNvPr id="3" name="Subtitle 2">
-            <a:extLst>
-              <a:ext uri="{FF2B5EF4-FFF2-40B4-BE49-F238E27FC236}">
-                <a16:creationId xmlns:a16="http://schemas.microsoft.com/office/drawing/2014/main" id="{231E1227-EB78-6689-9D71-86CF318E1B2A}"/>
-              </a:ext>
-            </a:extLst>
-          </p:cNvPr>
+            <a:endParaRPr lang="en-US" dirty="0"/>
+          </a:p>
+        </p:txBody>
+      </p:sp>
+      <p:sp>
+        <p:nvSpPr>
+          <p:cNvPr id="3" name="Subtitle 2"/>
           <p:cNvSpPr>
             <a:spLocks noGrp="1"/>
           </p:cNvSpPr>
@@ -234,18 +238,13 @@
               <a:rPr lang="en-US"/>
               <a:t>Click to edit Master subtitle style</a:t>
             </a:r>
-          </a:p>
-        </p:txBody>
-      </p:sp>
-      <p:sp>
-        <p:nvSpPr>
-          <p:cNvPr id="4" name="Date Placeholder 3">
-            <a:extLst>
-              <a:ext uri="{FF2B5EF4-FFF2-40B4-BE49-F238E27FC236}">
-                <a16:creationId xmlns:a16="http://schemas.microsoft.com/office/drawing/2014/main" id="{45CCDDA9-21BB-538D-9595-445171E1872A}"/>
-              </a:ext>
-            </a:extLst>
-          </p:cNvPr>
+            <a:endParaRPr lang="en-US" dirty="0"/>
+          </a:p>
+        </p:txBody>
+      </p:sp>
+      <p:sp>
+        <p:nvSpPr>
+          <p:cNvPr id="4" name="Date Placeholder 3"/>
           <p:cNvSpPr>
             <a:spLocks noGrp="1"/>
           </p:cNvSpPr>
@@ -268,13 +267,7 @@
       </p:sp>
       <p:sp>
         <p:nvSpPr>
-          <p:cNvPr id="5" name="Footer Placeholder 4">
-            <a:extLst>
-              <a:ext uri="{FF2B5EF4-FFF2-40B4-BE49-F238E27FC236}">
-                <a16:creationId xmlns:a16="http://schemas.microsoft.com/office/drawing/2014/main" id="{D42D53C8-0C40-9E65-2240-42C3827B265B}"/>
-              </a:ext>
-            </a:extLst>
-          </p:cNvPr>
+          <p:cNvPr id="5" name="Footer Placeholder 4"/>
           <p:cNvSpPr>
             <a:spLocks noGrp="1"/>
           </p:cNvSpPr>
@@ -293,13 +286,7 @@
       </p:sp>
       <p:sp>
         <p:nvSpPr>
-          <p:cNvPr id="6" name="Slide Number Placeholder 5">
-            <a:extLst>
-              <a:ext uri="{FF2B5EF4-FFF2-40B4-BE49-F238E27FC236}">
-                <a16:creationId xmlns:a16="http://schemas.microsoft.com/office/drawing/2014/main" id="{7A82431A-6A0E-B159-2B75-4805185016BE}"/>
-              </a:ext>
-            </a:extLst>
-          </p:cNvPr>
+          <p:cNvPr id="6" name="Slide Number Placeholder 5"/>
           <p:cNvSpPr>
             <a:spLocks noGrp="1"/>
           </p:cNvSpPr>
@@ -323,7 +310,7 @@
     </p:spTree>
     <p:extLst>
       <p:ext uri="{BB962C8B-B14F-4D97-AF65-F5344CB8AC3E}">
-        <p14:creationId xmlns:p14="http://schemas.microsoft.com/office/powerpoint/2010/main" val="3842549990"/>
+        <p14:creationId xmlns:p14="http://schemas.microsoft.com/office/powerpoint/2010/main" val="368050901"/>
       </p:ext>
     </p:extLst>
   </p:cSld>
@@ -352,13 +339,7 @@
       </p:grpSpPr>
       <p:sp>
         <p:nvSpPr>
-          <p:cNvPr id="2" name="Title 1">
-            <a:extLst>
-              <a:ext uri="{FF2B5EF4-FFF2-40B4-BE49-F238E27FC236}">
-                <a16:creationId xmlns:a16="http://schemas.microsoft.com/office/drawing/2014/main" id="{0D6B2130-905C-45A1-46E8-2E3D5ECF2231}"/>
-              </a:ext>
-            </a:extLst>
-          </p:cNvPr>
+          <p:cNvPr id="2" name="Title 1"/>
           <p:cNvSpPr>
             <a:spLocks noGrp="1"/>
           </p:cNvSpPr>
@@ -375,18 +356,13 @@
               <a:rPr lang="en-US"/>
               <a:t>Click to edit Master title style</a:t>
             </a:r>
-          </a:p>
-        </p:txBody>
-      </p:sp>
-      <p:sp>
-        <p:nvSpPr>
-          <p:cNvPr id="3" name="Vertical Text Placeholder 2">
-            <a:extLst>
-              <a:ext uri="{FF2B5EF4-FFF2-40B4-BE49-F238E27FC236}">
-                <a16:creationId xmlns:a16="http://schemas.microsoft.com/office/drawing/2014/main" id="{C209ABFA-976B-4F5A-2789-AC66CF485F46}"/>
-              </a:ext>
-            </a:extLst>
-          </p:cNvPr>
+            <a:endParaRPr lang="en-US" dirty="0"/>
+          </a:p>
+        </p:txBody>
+      </p:sp>
+      <p:sp>
+        <p:nvSpPr>
+          <p:cNvPr id="3" name="Vertical Text Placeholder 2"/>
           <p:cNvSpPr>
             <a:spLocks noGrp="1"/>
           </p:cNvSpPr>
@@ -432,18 +408,13 @@
               <a:rPr lang="en-US"/>
               <a:t>Fifth level</a:t>
             </a:r>
-          </a:p>
-        </p:txBody>
-      </p:sp>
-      <p:sp>
-        <p:nvSpPr>
-          <p:cNvPr id="4" name="Date Placeholder 3">
-            <a:extLst>
-              <a:ext uri="{FF2B5EF4-FFF2-40B4-BE49-F238E27FC236}">
-                <a16:creationId xmlns:a16="http://schemas.microsoft.com/office/drawing/2014/main" id="{96E789A6-3446-1725-1AF5-B81A067D846F}"/>
-              </a:ext>
-            </a:extLst>
-          </p:cNvPr>
+            <a:endParaRPr lang="en-US" dirty="0"/>
+          </a:p>
+        </p:txBody>
+      </p:sp>
+      <p:sp>
+        <p:nvSpPr>
+          <p:cNvPr id="4" name="Date Placeholder 3"/>
           <p:cNvSpPr>
             <a:spLocks noGrp="1"/>
           </p:cNvSpPr>
@@ -466,13 +437,7 @@
       </p:sp>
       <p:sp>
         <p:nvSpPr>
-          <p:cNvPr id="5" name="Footer Placeholder 4">
-            <a:extLst>
-              <a:ext uri="{FF2B5EF4-FFF2-40B4-BE49-F238E27FC236}">
-                <a16:creationId xmlns:a16="http://schemas.microsoft.com/office/drawing/2014/main" id="{86769A49-4B33-14A5-6FA0-76FC83749F79}"/>
-              </a:ext>
-            </a:extLst>
-          </p:cNvPr>
+          <p:cNvPr id="5" name="Footer Placeholder 4"/>
           <p:cNvSpPr>
             <a:spLocks noGrp="1"/>
           </p:cNvSpPr>
@@ -491,13 +456,7 @@
       </p:sp>
       <p:sp>
         <p:nvSpPr>
-          <p:cNvPr id="6" name="Slide Number Placeholder 5">
-            <a:extLst>
-              <a:ext uri="{FF2B5EF4-FFF2-40B4-BE49-F238E27FC236}">
-                <a16:creationId xmlns:a16="http://schemas.microsoft.com/office/drawing/2014/main" id="{3C01DE7E-AD58-660C-058C-C79D6757E1DE}"/>
-              </a:ext>
-            </a:extLst>
-          </p:cNvPr>
+          <p:cNvPr id="6" name="Slide Number Placeholder 5"/>
           <p:cNvSpPr>
             <a:spLocks noGrp="1"/>
           </p:cNvSpPr>
@@ -521,7 +480,7 @@
     </p:spTree>
     <p:extLst>
       <p:ext uri="{BB962C8B-B14F-4D97-AF65-F5344CB8AC3E}">
-        <p14:creationId xmlns:p14="http://schemas.microsoft.com/office/powerpoint/2010/main" val="3154688225"/>
+        <p14:creationId xmlns:p14="http://schemas.microsoft.com/office/powerpoint/2010/main" val="201093840"/>
       </p:ext>
     </p:extLst>
   </p:cSld>
@@ -550,13 +509,7 @@
       </p:grpSpPr>
       <p:sp>
         <p:nvSpPr>
-          <p:cNvPr id="2" name="Vertical Title 1">
-            <a:extLst>
-              <a:ext uri="{FF2B5EF4-FFF2-40B4-BE49-F238E27FC236}">
-                <a16:creationId xmlns:a16="http://schemas.microsoft.com/office/drawing/2014/main" id="{5BAFEA93-4FFC-B643-4F06-BB405BF0F92A}"/>
-              </a:ext>
-            </a:extLst>
-          </p:cNvPr>
+          <p:cNvPr id="2" name="Vertical Title 1"/>
           <p:cNvSpPr>
             <a:spLocks noGrp="1"/>
           </p:cNvSpPr>
@@ -578,18 +531,13 @@
               <a:rPr lang="en-US"/>
               <a:t>Click to edit Master title style</a:t>
             </a:r>
-          </a:p>
-        </p:txBody>
-      </p:sp>
-      <p:sp>
-        <p:nvSpPr>
-          <p:cNvPr id="3" name="Vertical Text Placeholder 2">
-            <a:extLst>
-              <a:ext uri="{FF2B5EF4-FFF2-40B4-BE49-F238E27FC236}">
-                <a16:creationId xmlns:a16="http://schemas.microsoft.com/office/drawing/2014/main" id="{98340905-3FEE-053E-F794-7D6FB52F4E29}"/>
-              </a:ext>
-            </a:extLst>
-          </p:cNvPr>
+            <a:endParaRPr lang="en-US" dirty="0"/>
+          </a:p>
+        </p:txBody>
+      </p:sp>
+      <p:sp>
+        <p:nvSpPr>
+          <p:cNvPr id="3" name="Vertical Text Placeholder 2"/>
           <p:cNvSpPr>
             <a:spLocks noGrp="1"/>
           </p:cNvSpPr>
@@ -640,18 +588,13 @@
               <a:rPr lang="en-US"/>
               <a:t>Fifth level</a:t>
             </a:r>
-          </a:p>
-        </p:txBody>
-      </p:sp>
-      <p:sp>
-        <p:nvSpPr>
-          <p:cNvPr id="4" name="Date Placeholder 3">
-            <a:extLst>
-              <a:ext uri="{FF2B5EF4-FFF2-40B4-BE49-F238E27FC236}">
-                <a16:creationId xmlns:a16="http://schemas.microsoft.com/office/drawing/2014/main" id="{B8DD1866-3418-7946-3156-7AB492923DCB}"/>
-              </a:ext>
-            </a:extLst>
-          </p:cNvPr>
+            <a:endParaRPr lang="en-US" dirty="0"/>
+          </a:p>
+        </p:txBody>
+      </p:sp>
+      <p:sp>
+        <p:nvSpPr>
+          <p:cNvPr id="4" name="Date Placeholder 3"/>
           <p:cNvSpPr>
             <a:spLocks noGrp="1"/>
           </p:cNvSpPr>
@@ -674,13 +617,7 @@
       </p:sp>
       <p:sp>
         <p:nvSpPr>
-          <p:cNvPr id="5" name="Footer Placeholder 4">
-            <a:extLst>
-              <a:ext uri="{FF2B5EF4-FFF2-40B4-BE49-F238E27FC236}">
-                <a16:creationId xmlns:a16="http://schemas.microsoft.com/office/drawing/2014/main" id="{BF77BA5F-C74D-4C3A-9697-AE822303C7C3}"/>
-              </a:ext>
-            </a:extLst>
-          </p:cNvPr>
+          <p:cNvPr id="5" name="Footer Placeholder 4"/>
           <p:cNvSpPr>
             <a:spLocks noGrp="1"/>
           </p:cNvSpPr>
@@ -699,13 +636,7 @@
       </p:sp>
       <p:sp>
         <p:nvSpPr>
-          <p:cNvPr id="6" name="Slide Number Placeholder 5">
-            <a:extLst>
-              <a:ext uri="{FF2B5EF4-FFF2-40B4-BE49-F238E27FC236}">
-                <a16:creationId xmlns:a16="http://schemas.microsoft.com/office/drawing/2014/main" id="{E2D49A78-3FAE-7B7B-9D4D-BF58A2A3085F}"/>
-              </a:ext>
-            </a:extLst>
-          </p:cNvPr>
+          <p:cNvPr id="6" name="Slide Number Placeholder 5"/>
           <p:cNvSpPr>
             <a:spLocks noGrp="1"/>
           </p:cNvSpPr>
@@ -729,7 +660,7 @@
     </p:spTree>
     <p:extLst>
       <p:ext uri="{BB962C8B-B14F-4D97-AF65-F5344CB8AC3E}">
-        <p14:creationId xmlns:p14="http://schemas.microsoft.com/office/powerpoint/2010/main" val="3551790297"/>
+        <p14:creationId xmlns:p14="http://schemas.microsoft.com/office/powerpoint/2010/main" val="1684095915"/>
       </p:ext>
     </p:extLst>
   </p:cSld>
@@ -758,13 +689,7 @@
       </p:grpSpPr>
       <p:sp>
         <p:nvSpPr>
-          <p:cNvPr id="2" name="Title 1">
-            <a:extLst>
-              <a:ext uri="{FF2B5EF4-FFF2-40B4-BE49-F238E27FC236}">
-                <a16:creationId xmlns:a16="http://schemas.microsoft.com/office/drawing/2014/main" id="{A4531651-0A42-6585-8B14-40F0A0370677}"/>
-              </a:ext>
-            </a:extLst>
-          </p:cNvPr>
+          <p:cNvPr id="2" name="Title 1"/>
           <p:cNvSpPr>
             <a:spLocks noGrp="1"/>
           </p:cNvSpPr>
@@ -781,18 +706,13 @@
               <a:rPr lang="en-US"/>
               <a:t>Click to edit Master title style</a:t>
             </a:r>
-          </a:p>
-        </p:txBody>
-      </p:sp>
-      <p:sp>
-        <p:nvSpPr>
-          <p:cNvPr id="3" name="Content Placeholder 2">
-            <a:extLst>
-              <a:ext uri="{FF2B5EF4-FFF2-40B4-BE49-F238E27FC236}">
-                <a16:creationId xmlns:a16="http://schemas.microsoft.com/office/drawing/2014/main" id="{E25AD9E0-9519-B0C1-AD49-A1042C0BBC40}"/>
-              </a:ext>
-            </a:extLst>
-          </p:cNvPr>
+            <a:endParaRPr lang="en-US" dirty="0"/>
+          </a:p>
+        </p:txBody>
+      </p:sp>
+      <p:sp>
+        <p:nvSpPr>
+          <p:cNvPr id="3" name="Content Placeholder 2"/>
           <p:cNvSpPr>
             <a:spLocks noGrp="1"/>
           </p:cNvSpPr>
@@ -838,18 +758,13 @@
               <a:rPr lang="en-US"/>
               <a:t>Fifth level</a:t>
             </a:r>
-          </a:p>
-        </p:txBody>
-      </p:sp>
-      <p:sp>
-        <p:nvSpPr>
-          <p:cNvPr id="4" name="Date Placeholder 3">
-            <a:extLst>
-              <a:ext uri="{FF2B5EF4-FFF2-40B4-BE49-F238E27FC236}">
-                <a16:creationId xmlns:a16="http://schemas.microsoft.com/office/drawing/2014/main" id="{F44B328A-CD91-6D07-1F52-3A9C300335E4}"/>
-              </a:ext>
-            </a:extLst>
-          </p:cNvPr>
+            <a:endParaRPr lang="en-US" dirty="0"/>
+          </a:p>
+        </p:txBody>
+      </p:sp>
+      <p:sp>
+        <p:nvSpPr>
+          <p:cNvPr id="4" name="Date Placeholder 3"/>
           <p:cNvSpPr>
             <a:spLocks noGrp="1"/>
           </p:cNvSpPr>
@@ -872,13 +787,7 @@
       </p:sp>
       <p:sp>
         <p:nvSpPr>
-          <p:cNvPr id="5" name="Footer Placeholder 4">
-            <a:extLst>
-              <a:ext uri="{FF2B5EF4-FFF2-40B4-BE49-F238E27FC236}">
-                <a16:creationId xmlns:a16="http://schemas.microsoft.com/office/drawing/2014/main" id="{C0E6EC6D-630D-36DB-1858-C304C6E516C0}"/>
-              </a:ext>
-            </a:extLst>
-          </p:cNvPr>
+          <p:cNvPr id="5" name="Footer Placeholder 4"/>
           <p:cNvSpPr>
             <a:spLocks noGrp="1"/>
           </p:cNvSpPr>
@@ -897,13 +806,7 @@
       </p:sp>
       <p:sp>
         <p:nvSpPr>
-          <p:cNvPr id="6" name="Slide Number Placeholder 5">
-            <a:extLst>
-              <a:ext uri="{FF2B5EF4-FFF2-40B4-BE49-F238E27FC236}">
-                <a16:creationId xmlns:a16="http://schemas.microsoft.com/office/drawing/2014/main" id="{A67C0906-C7DA-CC38-F5D3-F7ED4F4FC756}"/>
-              </a:ext>
-            </a:extLst>
-          </p:cNvPr>
+          <p:cNvPr id="6" name="Slide Number Placeholder 5"/>
           <p:cNvSpPr>
             <a:spLocks noGrp="1"/>
           </p:cNvSpPr>
@@ -927,7 +830,7 @@
     </p:spTree>
     <p:extLst>
       <p:ext uri="{BB962C8B-B14F-4D97-AF65-F5344CB8AC3E}">
-        <p14:creationId xmlns:p14="http://schemas.microsoft.com/office/powerpoint/2010/main" val="2782591616"/>
+        <p14:creationId xmlns:p14="http://schemas.microsoft.com/office/powerpoint/2010/main" val="2754301381"/>
       </p:ext>
     </p:extLst>
   </p:cSld>
@@ -956,13 +859,7 @@
       </p:grpSpPr>
       <p:sp>
         <p:nvSpPr>
-          <p:cNvPr id="2" name="Title 1">
-            <a:extLst>
-              <a:ext uri="{FF2B5EF4-FFF2-40B4-BE49-F238E27FC236}">
-                <a16:creationId xmlns:a16="http://schemas.microsoft.com/office/drawing/2014/main" id="{B91692A3-9E34-9DC3-4F88-15CB4804DF74}"/>
-              </a:ext>
-            </a:extLst>
-          </p:cNvPr>
+          <p:cNvPr id="2" name="Title 1"/>
           <p:cNvSpPr>
             <a:spLocks noGrp="1"/>
           </p:cNvSpPr>
@@ -988,18 +885,13 @@
               <a:rPr lang="en-US"/>
               <a:t>Click to edit Master title style</a:t>
             </a:r>
-          </a:p>
-        </p:txBody>
-      </p:sp>
-      <p:sp>
-        <p:nvSpPr>
-          <p:cNvPr id="3" name="Text Placeholder 2">
-            <a:extLst>
-              <a:ext uri="{FF2B5EF4-FFF2-40B4-BE49-F238E27FC236}">
-                <a16:creationId xmlns:a16="http://schemas.microsoft.com/office/drawing/2014/main" id="{89E9628C-1442-6086-9492-0180DEB92B92}"/>
-              </a:ext>
-            </a:extLst>
-          </p:cNvPr>
+            <a:endParaRPr lang="en-US" dirty="0"/>
+          </a:p>
+        </p:txBody>
+      </p:sp>
+      <p:sp>
+        <p:nvSpPr>
+          <p:cNvPr id="3" name="Text Placeholder 2"/>
           <p:cNvSpPr>
             <a:spLocks noGrp="1"/>
           </p:cNvSpPr>
@@ -1021,7 +913,7 @@
               <a:defRPr sz="2400">
                 <a:solidFill>
                   <a:schemeClr val="tx1">
-                    <a:tint val="82000"/>
+                    <a:shade val="82000"/>
                   </a:schemeClr>
                 </a:solidFill>
               </a:defRPr>
@@ -1031,7 +923,7 @@
               <a:defRPr sz="2000">
                 <a:solidFill>
                   <a:schemeClr val="tx1">
-                    <a:tint val="82000"/>
+                    <a:shade val="82000"/>
                   </a:schemeClr>
                 </a:solidFill>
               </a:defRPr>
@@ -1041,7 +933,7 @@
               <a:defRPr sz="1800">
                 <a:solidFill>
                   <a:schemeClr val="tx1">
-                    <a:tint val="82000"/>
+                    <a:shade val="82000"/>
                   </a:schemeClr>
                 </a:solidFill>
               </a:defRPr>
@@ -1051,7 +943,7 @@
               <a:defRPr sz="1600">
                 <a:solidFill>
                   <a:schemeClr val="tx1">
-                    <a:tint val="82000"/>
+                    <a:shade val="82000"/>
                   </a:schemeClr>
                 </a:solidFill>
               </a:defRPr>
@@ -1061,7 +953,7 @@
               <a:defRPr sz="1600">
                 <a:solidFill>
                   <a:schemeClr val="tx1">
-                    <a:tint val="82000"/>
+                    <a:shade val="82000"/>
                   </a:schemeClr>
                 </a:solidFill>
               </a:defRPr>
@@ -1071,7 +963,7 @@
               <a:defRPr sz="1600">
                 <a:solidFill>
                   <a:schemeClr val="tx1">
-                    <a:tint val="82000"/>
+                    <a:shade val="82000"/>
                   </a:schemeClr>
                 </a:solidFill>
               </a:defRPr>
@@ -1081,7 +973,7 @@
               <a:defRPr sz="1600">
                 <a:solidFill>
                   <a:schemeClr val="tx1">
-                    <a:tint val="82000"/>
+                    <a:shade val="82000"/>
                   </a:schemeClr>
                 </a:solidFill>
               </a:defRPr>
@@ -1091,7 +983,7 @@
               <a:defRPr sz="1600">
                 <a:solidFill>
                   <a:schemeClr val="tx1">
-                    <a:tint val="82000"/>
+                    <a:shade val="82000"/>
                   </a:schemeClr>
                 </a:solidFill>
               </a:defRPr>
@@ -1101,7 +993,7 @@
               <a:defRPr sz="1600">
                 <a:solidFill>
                   <a:schemeClr val="tx1">
-                    <a:tint val="82000"/>
+                    <a:shade val="82000"/>
                   </a:schemeClr>
                 </a:solidFill>
               </a:defRPr>
@@ -1118,13 +1010,7 @@
       </p:sp>
       <p:sp>
         <p:nvSpPr>
-          <p:cNvPr id="4" name="Date Placeholder 3">
-            <a:extLst>
-              <a:ext uri="{FF2B5EF4-FFF2-40B4-BE49-F238E27FC236}">
-                <a16:creationId xmlns:a16="http://schemas.microsoft.com/office/drawing/2014/main" id="{CFAC3601-1ED7-0543-CF38-6A794DE40B08}"/>
-              </a:ext>
-            </a:extLst>
-          </p:cNvPr>
+          <p:cNvPr id="4" name="Date Placeholder 3"/>
           <p:cNvSpPr>
             <a:spLocks noGrp="1"/>
           </p:cNvSpPr>
@@ -1147,13 +1033,7 @@
       </p:sp>
       <p:sp>
         <p:nvSpPr>
-          <p:cNvPr id="5" name="Footer Placeholder 4">
-            <a:extLst>
-              <a:ext uri="{FF2B5EF4-FFF2-40B4-BE49-F238E27FC236}">
-                <a16:creationId xmlns:a16="http://schemas.microsoft.com/office/drawing/2014/main" id="{F59A30C9-3981-80AD-9896-A8F62E29F3C9}"/>
-              </a:ext>
-            </a:extLst>
-          </p:cNvPr>
+          <p:cNvPr id="5" name="Footer Placeholder 4"/>
           <p:cNvSpPr>
             <a:spLocks noGrp="1"/>
           </p:cNvSpPr>
@@ -1172,13 +1052,7 @@
       </p:sp>
       <p:sp>
         <p:nvSpPr>
-          <p:cNvPr id="6" name="Slide Number Placeholder 5">
-            <a:extLst>
-              <a:ext uri="{FF2B5EF4-FFF2-40B4-BE49-F238E27FC236}">
-                <a16:creationId xmlns:a16="http://schemas.microsoft.com/office/drawing/2014/main" id="{34A73973-3625-1ECD-5441-F53EF115605C}"/>
-              </a:ext>
-            </a:extLst>
-          </p:cNvPr>
+          <p:cNvPr id="6" name="Slide Number Placeholder 5"/>
           <p:cNvSpPr>
             <a:spLocks noGrp="1"/>
           </p:cNvSpPr>
@@ -1202,7 +1076,7 @@
     </p:spTree>
     <p:extLst>
       <p:ext uri="{BB962C8B-B14F-4D97-AF65-F5344CB8AC3E}">
-        <p14:creationId xmlns:p14="http://schemas.microsoft.com/office/powerpoint/2010/main" val="2233665091"/>
+        <p14:creationId xmlns:p14="http://schemas.microsoft.com/office/powerpoint/2010/main" val="2074026557"/>
       </p:ext>
     </p:extLst>
   </p:cSld>
@@ -1231,13 +1105,7 @@
       </p:grpSpPr>
       <p:sp>
         <p:nvSpPr>
-          <p:cNvPr id="2" name="Title 1">
-            <a:extLst>
-              <a:ext uri="{FF2B5EF4-FFF2-40B4-BE49-F238E27FC236}">
-                <a16:creationId xmlns:a16="http://schemas.microsoft.com/office/drawing/2014/main" id="{90D26B7D-B477-9AE0-062D-494120FBF5FA}"/>
-              </a:ext>
-            </a:extLst>
-          </p:cNvPr>
+          <p:cNvPr id="2" name="Title 1"/>
           <p:cNvSpPr>
             <a:spLocks noGrp="1"/>
           </p:cNvSpPr>
@@ -1254,18 +1122,13 @@
               <a:rPr lang="en-US"/>
               <a:t>Click to edit Master title style</a:t>
             </a:r>
-          </a:p>
-        </p:txBody>
-      </p:sp>
-      <p:sp>
-        <p:nvSpPr>
-          <p:cNvPr id="3" name="Content Placeholder 2">
-            <a:extLst>
-              <a:ext uri="{FF2B5EF4-FFF2-40B4-BE49-F238E27FC236}">
-                <a16:creationId xmlns:a16="http://schemas.microsoft.com/office/drawing/2014/main" id="{4678334D-754A-9228-E727-A785E3689FA8}"/>
-              </a:ext>
-            </a:extLst>
-          </p:cNvPr>
+            <a:endParaRPr lang="en-US" dirty="0"/>
+          </a:p>
+        </p:txBody>
+      </p:sp>
+      <p:sp>
+        <p:nvSpPr>
+          <p:cNvPr id="3" name="Content Placeholder 2"/>
           <p:cNvSpPr>
             <a:spLocks noGrp="1"/>
           </p:cNvSpPr>
@@ -1316,18 +1179,13 @@
               <a:rPr lang="en-US"/>
               <a:t>Fifth level</a:t>
             </a:r>
-          </a:p>
-        </p:txBody>
-      </p:sp>
-      <p:sp>
-        <p:nvSpPr>
-          <p:cNvPr id="4" name="Content Placeholder 3">
-            <a:extLst>
-              <a:ext uri="{FF2B5EF4-FFF2-40B4-BE49-F238E27FC236}">
-                <a16:creationId xmlns:a16="http://schemas.microsoft.com/office/drawing/2014/main" id="{FA0B3C73-0936-660B-A671-EA8DD9938724}"/>
-              </a:ext>
-            </a:extLst>
-          </p:cNvPr>
+            <a:endParaRPr lang="en-US" dirty="0"/>
+          </a:p>
+        </p:txBody>
+      </p:sp>
+      <p:sp>
+        <p:nvSpPr>
+          <p:cNvPr id="4" name="Content Placeholder 3"/>
           <p:cNvSpPr>
             <a:spLocks noGrp="1"/>
           </p:cNvSpPr>
@@ -1378,18 +1236,13 @@
               <a:rPr lang="en-US"/>
               <a:t>Fifth level</a:t>
             </a:r>
-          </a:p>
-        </p:txBody>
-      </p:sp>
-      <p:sp>
-        <p:nvSpPr>
-          <p:cNvPr id="5" name="Date Placeholder 4">
-            <a:extLst>
-              <a:ext uri="{FF2B5EF4-FFF2-40B4-BE49-F238E27FC236}">
-                <a16:creationId xmlns:a16="http://schemas.microsoft.com/office/drawing/2014/main" id="{5BF5F155-C09A-DBF0-B860-0F56911D7F49}"/>
-              </a:ext>
-            </a:extLst>
-          </p:cNvPr>
+            <a:endParaRPr lang="en-US" dirty="0"/>
+          </a:p>
+        </p:txBody>
+      </p:sp>
+      <p:sp>
+        <p:nvSpPr>
+          <p:cNvPr id="5" name="Date Placeholder 4"/>
           <p:cNvSpPr>
             <a:spLocks noGrp="1"/>
           </p:cNvSpPr>
@@ -1412,13 +1265,7 @@
       </p:sp>
       <p:sp>
         <p:nvSpPr>
-          <p:cNvPr id="6" name="Footer Placeholder 5">
-            <a:extLst>
-              <a:ext uri="{FF2B5EF4-FFF2-40B4-BE49-F238E27FC236}">
-                <a16:creationId xmlns:a16="http://schemas.microsoft.com/office/drawing/2014/main" id="{7C57F3CB-B682-2EB4-E6BC-5C1A979D8375}"/>
-              </a:ext>
-            </a:extLst>
-          </p:cNvPr>
+          <p:cNvPr id="6" name="Footer Placeholder 5"/>
           <p:cNvSpPr>
             <a:spLocks noGrp="1"/>
           </p:cNvSpPr>
@@ -1437,13 +1284,7 @@
       </p:sp>
       <p:sp>
         <p:nvSpPr>
-          <p:cNvPr id="7" name="Slide Number Placeholder 6">
-            <a:extLst>
-              <a:ext uri="{FF2B5EF4-FFF2-40B4-BE49-F238E27FC236}">
-                <a16:creationId xmlns:a16="http://schemas.microsoft.com/office/drawing/2014/main" id="{D2639573-4BB5-5700-C488-7AEA2D752FD1}"/>
-              </a:ext>
-            </a:extLst>
-          </p:cNvPr>
+          <p:cNvPr id="7" name="Slide Number Placeholder 6"/>
           <p:cNvSpPr>
             <a:spLocks noGrp="1"/>
           </p:cNvSpPr>
@@ -1467,7 +1308,7 @@
     </p:spTree>
     <p:extLst>
       <p:ext uri="{BB962C8B-B14F-4D97-AF65-F5344CB8AC3E}">
-        <p14:creationId xmlns:p14="http://schemas.microsoft.com/office/powerpoint/2010/main" val="1377654120"/>
+        <p14:creationId xmlns:p14="http://schemas.microsoft.com/office/powerpoint/2010/main" val="3076988008"/>
       </p:ext>
     </p:extLst>
   </p:cSld>
@@ -1496,13 +1337,7 @@
       </p:grpSpPr>
       <p:sp>
         <p:nvSpPr>
-          <p:cNvPr id="2" name="Title 1">
-            <a:extLst>
-              <a:ext uri="{FF2B5EF4-FFF2-40B4-BE49-F238E27FC236}">
-                <a16:creationId xmlns:a16="http://schemas.microsoft.com/office/drawing/2014/main" id="{573240B9-77D5-221C-B05D-D64FA284E3D1}"/>
-              </a:ext>
-            </a:extLst>
-          </p:cNvPr>
+          <p:cNvPr id="2" name="Title 1"/>
           <p:cNvSpPr>
             <a:spLocks noGrp="1"/>
           </p:cNvSpPr>
@@ -1524,18 +1359,13 @@
               <a:rPr lang="en-US"/>
               <a:t>Click to edit Master title style</a:t>
             </a:r>
-          </a:p>
-        </p:txBody>
-      </p:sp>
-      <p:sp>
-        <p:nvSpPr>
-          <p:cNvPr id="3" name="Text Placeholder 2">
-            <a:extLst>
-              <a:ext uri="{FF2B5EF4-FFF2-40B4-BE49-F238E27FC236}">
-                <a16:creationId xmlns:a16="http://schemas.microsoft.com/office/drawing/2014/main" id="{FA9BDFDF-ED94-D05B-3AEC-82289BDB56A0}"/>
-              </a:ext>
-            </a:extLst>
-          </p:cNvPr>
+            <a:endParaRPr lang="en-US" dirty="0"/>
+          </a:p>
+        </p:txBody>
+      </p:sp>
+      <p:sp>
+        <p:nvSpPr>
+          <p:cNvPr id="3" name="Text Placeholder 2"/>
           <p:cNvSpPr>
             <a:spLocks noGrp="1"/>
           </p:cNvSpPr>
@@ -1600,13 +1430,7 @@
       </p:sp>
       <p:sp>
         <p:nvSpPr>
-          <p:cNvPr id="4" name="Content Placeholder 3">
-            <a:extLst>
-              <a:ext uri="{FF2B5EF4-FFF2-40B4-BE49-F238E27FC236}">
-                <a16:creationId xmlns:a16="http://schemas.microsoft.com/office/drawing/2014/main" id="{D4BAE5AA-7FE2-CBB7-9765-787633708F7D}"/>
-              </a:ext>
-            </a:extLst>
-          </p:cNvPr>
+          <p:cNvPr id="4" name="Content Placeholder 3"/>
           <p:cNvSpPr>
             <a:spLocks noGrp="1"/>
           </p:cNvSpPr>
@@ -1657,18 +1481,13 @@
               <a:rPr lang="en-US"/>
               <a:t>Fifth level</a:t>
             </a:r>
-          </a:p>
-        </p:txBody>
-      </p:sp>
-      <p:sp>
-        <p:nvSpPr>
-          <p:cNvPr id="5" name="Text Placeholder 4">
-            <a:extLst>
-              <a:ext uri="{FF2B5EF4-FFF2-40B4-BE49-F238E27FC236}">
-                <a16:creationId xmlns:a16="http://schemas.microsoft.com/office/drawing/2014/main" id="{1763FA7E-4EB7-DEA3-CA7A-61E182264C94}"/>
-              </a:ext>
-            </a:extLst>
-          </p:cNvPr>
+            <a:endParaRPr lang="en-US" dirty="0"/>
+          </a:p>
+        </p:txBody>
+      </p:sp>
+      <p:sp>
+        <p:nvSpPr>
+          <p:cNvPr id="5" name="Text Placeholder 4"/>
           <p:cNvSpPr>
             <a:spLocks noGrp="1"/>
           </p:cNvSpPr>
@@ -1733,13 +1552,7 @@
       </p:sp>
       <p:sp>
         <p:nvSpPr>
-          <p:cNvPr id="6" name="Content Placeholder 5">
-            <a:extLst>
-              <a:ext uri="{FF2B5EF4-FFF2-40B4-BE49-F238E27FC236}">
-                <a16:creationId xmlns:a16="http://schemas.microsoft.com/office/drawing/2014/main" id="{8EAFE1D7-3CDE-F658-C54C-0FD01D189FEF}"/>
-              </a:ext>
-            </a:extLst>
-          </p:cNvPr>
+          <p:cNvPr id="6" name="Content Placeholder 5"/>
           <p:cNvSpPr>
             <a:spLocks noGrp="1"/>
           </p:cNvSpPr>
@@ -1790,18 +1603,13 @@
               <a:rPr lang="en-US"/>
               <a:t>Fifth level</a:t>
             </a:r>
-          </a:p>
-        </p:txBody>
-      </p:sp>
-      <p:sp>
-        <p:nvSpPr>
-          <p:cNvPr id="7" name="Date Placeholder 6">
-            <a:extLst>
-              <a:ext uri="{FF2B5EF4-FFF2-40B4-BE49-F238E27FC236}">
-                <a16:creationId xmlns:a16="http://schemas.microsoft.com/office/drawing/2014/main" id="{E2FA3902-E460-D664-156F-F8A847BB05C9}"/>
-              </a:ext>
-            </a:extLst>
-          </p:cNvPr>
+            <a:endParaRPr lang="en-US" dirty="0"/>
+          </a:p>
+        </p:txBody>
+      </p:sp>
+      <p:sp>
+        <p:nvSpPr>
+          <p:cNvPr id="7" name="Date Placeholder 6"/>
           <p:cNvSpPr>
             <a:spLocks noGrp="1"/>
           </p:cNvSpPr>
@@ -1824,13 +1632,7 @@
       </p:sp>
       <p:sp>
         <p:nvSpPr>
-          <p:cNvPr id="8" name="Footer Placeholder 7">
-            <a:extLst>
-              <a:ext uri="{FF2B5EF4-FFF2-40B4-BE49-F238E27FC236}">
-                <a16:creationId xmlns:a16="http://schemas.microsoft.com/office/drawing/2014/main" id="{2ED2DD77-3F4C-D108-50F5-4EB26CE14B26}"/>
-              </a:ext>
-            </a:extLst>
-          </p:cNvPr>
+          <p:cNvPr id="8" name="Footer Placeholder 7"/>
           <p:cNvSpPr>
             <a:spLocks noGrp="1"/>
           </p:cNvSpPr>
@@ -1849,13 +1651,7 @@
       </p:sp>
       <p:sp>
         <p:nvSpPr>
-          <p:cNvPr id="9" name="Slide Number Placeholder 8">
-            <a:extLst>
-              <a:ext uri="{FF2B5EF4-FFF2-40B4-BE49-F238E27FC236}">
-                <a16:creationId xmlns:a16="http://schemas.microsoft.com/office/drawing/2014/main" id="{FF1BCD5B-276E-4927-62FC-A623E8AB3B8A}"/>
-              </a:ext>
-            </a:extLst>
-          </p:cNvPr>
+          <p:cNvPr id="9" name="Slide Number Placeholder 8"/>
           <p:cNvSpPr>
             <a:spLocks noGrp="1"/>
           </p:cNvSpPr>
@@ -1879,7 +1675,7 @@
     </p:spTree>
     <p:extLst>
       <p:ext uri="{BB962C8B-B14F-4D97-AF65-F5344CB8AC3E}">
-        <p14:creationId xmlns:p14="http://schemas.microsoft.com/office/powerpoint/2010/main" val="779937176"/>
+        <p14:creationId xmlns:p14="http://schemas.microsoft.com/office/powerpoint/2010/main" val="896181383"/>
       </p:ext>
     </p:extLst>
   </p:cSld>
@@ -1908,13 +1704,7 @@
       </p:grpSpPr>
       <p:sp>
         <p:nvSpPr>
-          <p:cNvPr id="2" name="Title 1">
-            <a:extLst>
-              <a:ext uri="{FF2B5EF4-FFF2-40B4-BE49-F238E27FC236}">
-                <a16:creationId xmlns:a16="http://schemas.microsoft.com/office/drawing/2014/main" id="{1B2BB8B9-BA5B-8B82-11B1-0CB52769E388}"/>
-              </a:ext>
-            </a:extLst>
-          </p:cNvPr>
+          <p:cNvPr id="2" name="Title 1"/>
           <p:cNvSpPr>
             <a:spLocks noGrp="1"/>
           </p:cNvSpPr>
@@ -1931,18 +1721,13 @@
               <a:rPr lang="en-US"/>
               <a:t>Click to edit Master title style</a:t>
             </a:r>
-          </a:p>
-        </p:txBody>
-      </p:sp>
-      <p:sp>
-        <p:nvSpPr>
-          <p:cNvPr id="3" name="Date Placeholder 2">
-            <a:extLst>
-              <a:ext uri="{FF2B5EF4-FFF2-40B4-BE49-F238E27FC236}">
-                <a16:creationId xmlns:a16="http://schemas.microsoft.com/office/drawing/2014/main" id="{EDB14A74-21D3-98EB-50B6-C83A58C0F3E7}"/>
-              </a:ext>
-            </a:extLst>
-          </p:cNvPr>
+            <a:endParaRPr lang="en-US" dirty="0"/>
+          </a:p>
+        </p:txBody>
+      </p:sp>
+      <p:sp>
+        <p:nvSpPr>
+          <p:cNvPr id="3" name="Date Placeholder 2"/>
           <p:cNvSpPr>
             <a:spLocks noGrp="1"/>
           </p:cNvSpPr>
@@ -1965,13 +1750,7 @@
       </p:sp>
       <p:sp>
         <p:nvSpPr>
-          <p:cNvPr id="4" name="Footer Placeholder 3">
-            <a:extLst>
-              <a:ext uri="{FF2B5EF4-FFF2-40B4-BE49-F238E27FC236}">
-                <a16:creationId xmlns:a16="http://schemas.microsoft.com/office/drawing/2014/main" id="{5D17496F-CCC0-ACB2-550A-6CFBFBB89B4F}"/>
-              </a:ext>
-            </a:extLst>
-          </p:cNvPr>
+          <p:cNvPr id="4" name="Footer Placeholder 3"/>
           <p:cNvSpPr>
             <a:spLocks noGrp="1"/>
           </p:cNvSpPr>
@@ -1990,13 +1769,7 @@
       </p:sp>
       <p:sp>
         <p:nvSpPr>
-          <p:cNvPr id="5" name="Slide Number Placeholder 4">
-            <a:extLst>
-              <a:ext uri="{FF2B5EF4-FFF2-40B4-BE49-F238E27FC236}">
-                <a16:creationId xmlns:a16="http://schemas.microsoft.com/office/drawing/2014/main" id="{41C5A689-C77F-5086-ED30-999E06395126}"/>
-              </a:ext>
-            </a:extLst>
-          </p:cNvPr>
+          <p:cNvPr id="5" name="Slide Number Placeholder 4"/>
           <p:cNvSpPr>
             <a:spLocks noGrp="1"/>
           </p:cNvSpPr>
@@ -2020,7 +1793,7 @@
     </p:spTree>
     <p:extLst>
       <p:ext uri="{BB962C8B-B14F-4D97-AF65-F5344CB8AC3E}">
-        <p14:creationId xmlns:p14="http://schemas.microsoft.com/office/powerpoint/2010/main" val="197275365"/>
+        <p14:creationId xmlns:p14="http://schemas.microsoft.com/office/powerpoint/2010/main" val="3428885561"/>
       </p:ext>
     </p:extLst>
   </p:cSld>
@@ -2049,13 +1822,7 @@
       </p:grpSpPr>
       <p:sp>
         <p:nvSpPr>
-          <p:cNvPr id="2" name="Date Placeholder 1">
-            <a:extLst>
-              <a:ext uri="{FF2B5EF4-FFF2-40B4-BE49-F238E27FC236}">
-                <a16:creationId xmlns:a16="http://schemas.microsoft.com/office/drawing/2014/main" id="{6510A246-99EB-8B18-8733-0099D3779B1F}"/>
-              </a:ext>
-            </a:extLst>
-          </p:cNvPr>
+          <p:cNvPr id="2" name="Date Placeholder 1"/>
           <p:cNvSpPr>
             <a:spLocks noGrp="1"/>
           </p:cNvSpPr>
@@ -2078,13 +1845,7 @@
       </p:sp>
       <p:sp>
         <p:nvSpPr>
-          <p:cNvPr id="3" name="Footer Placeholder 2">
-            <a:extLst>
-              <a:ext uri="{FF2B5EF4-FFF2-40B4-BE49-F238E27FC236}">
-                <a16:creationId xmlns:a16="http://schemas.microsoft.com/office/drawing/2014/main" id="{98FE7B61-5CEA-F665-BBE9-BB64229A3CB9}"/>
-              </a:ext>
-            </a:extLst>
-          </p:cNvPr>
+          <p:cNvPr id="3" name="Footer Placeholder 2"/>
           <p:cNvSpPr>
             <a:spLocks noGrp="1"/>
           </p:cNvSpPr>
@@ -2103,13 +1864,7 @@
       </p:sp>
       <p:sp>
         <p:nvSpPr>
-          <p:cNvPr id="4" name="Slide Number Placeholder 3">
-            <a:extLst>
-              <a:ext uri="{FF2B5EF4-FFF2-40B4-BE49-F238E27FC236}">
-                <a16:creationId xmlns:a16="http://schemas.microsoft.com/office/drawing/2014/main" id="{195579E5-40E4-6AAC-EB5A-08FBE8EB5C73}"/>
-              </a:ext>
-            </a:extLst>
-          </p:cNvPr>
+          <p:cNvPr id="4" name="Slide Number Placeholder 3"/>
           <p:cNvSpPr>
             <a:spLocks noGrp="1"/>
           </p:cNvSpPr>
@@ -2133,7 +1888,7 @@
     </p:spTree>
     <p:extLst>
       <p:ext uri="{BB962C8B-B14F-4D97-AF65-F5344CB8AC3E}">
-        <p14:creationId xmlns:p14="http://schemas.microsoft.com/office/powerpoint/2010/main" val="4274003105"/>
+        <p14:creationId xmlns:p14="http://schemas.microsoft.com/office/powerpoint/2010/main" val="751608951"/>
       </p:ext>
     </p:extLst>
   </p:cSld>
@@ -2162,13 +1917,7 @@
       </p:grpSpPr>
       <p:sp>
         <p:nvSpPr>
-          <p:cNvPr id="2" name="Title 1">
-            <a:extLst>
-              <a:ext uri="{FF2B5EF4-FFF2-40B4-BE49-F238E27FC236}">
-                <a16:creationId xmlns:a16="http://schemas.microsoft.com/office/drawing/2014/main" id="{FB1FD4F9-9847-792A-F6E4-3C850B30C377}"/>
-              </a:ext>
-            </a:extLst>
-          </p:cNvPr>
+          <p:cNvPr id="2" name="Title 1"/>
           <p:cNvSpPr>
             <a:spLocks noGrp="1"/>
           </p:cNvSpPr>
@@ -2194,18 +1943,13 @@
               <a:rPr lang="en-US"/>
               <a:t>Click to edit Master title style</a:t>
             </a:r>
-          </a:p>
-        </p:txBody>
-      </p:sp>
-      <p:sp>
-        <p:nvSpPr>
-          <p:cNvPr id="3" name="Content Placeholder 2">
-            <a:extLst>
-              <a:ext uri="{FF2B5EF4-FFF2-40B4-BE49-F238E27FC236}">
-                <a16:creationId xmlns:a16="http://schemas.microsoft.com/office/drawing/2014/main" id="{0E574978-A6ED-B09A-1D26-72D124B2367E}"/>
-              </a:ext>
-            </a:extLst>
-          </p:cNvPr>
+            <a:endParaRPr lang="en-US" dirty="0"/>
+          </a:p>
+        </p:txBody>
+      </p:sp>
+      <p:sp>
+        <p:nvSpPr>
+          <p:cNvPr id="3" name="Content Placeholder 2"/>
           <p:cNvSpPr>
             <a:spLocks noGrp="1"/>
           </p:cNvSpPr>
@@ -2284,18 +2028,13 @@
               <a:rPr lang="en-US"/>
               <a:t>Fifth level</a:t>
             </a:r>
-          </a:p>
-        </p:txBody>
-      </p:sp>
-      <p:sp>
-        <p:nvSpPr>
-          <p:cNvPr id="4" name="Text Placeholder 3">
-            <a:extLst>
-              <a:ext uri="{FF2B5EF4-FFF2-40B4-BE49-F238E27FC236}">
-                <a16:creationId xmlns:a16="http://schemas.microsoft.com/office/drawing/2014/main" id="{B14C92BA-BA81-683E-D3E4-13711246388F}"/>
-              </a:ext>
-            </a:extLst>
-          </p:cNvPr>
+            <a:endParaRPr lang="en-US" dirty="0"/>
+          </a:p>
+        </p:txBody>
+      </p:sp>
+      <p:sp>
+        <p:nvSpPr>
+          <p:cNvPr id="4" name="Text Placeholder 3"/>
           <p:cNvSpPr>
             <a:spLocks noGrp="1"/>
           </p:cNvSpPr>
@@ -2360,13 +2099,7 @@
       </p:sp>
       <p:sp>
         <p:nvSpPr>
-          <p:cNvPr id="5" name="Date Placeholder 4">
-            <a:extLst>
-              <a:ext uri="{FF2B5EF4-FFF2-40B4-BE49-F238E27FC236}">
-                <a16:creationId xmlns:a16="http://schemas.microsoft.com/office/drawing/2014/main" id="{A03CFAB0-99F6-9BBB-2B3F-B0FBE2B1FA0B}"/>
-              </a:ext>
-            </a:extLst>
-          </p:cNvPr>
+          <p:cNvPr id="5" name="Date Placeholder 4"/>
           <p:cNvSpPr>
             <a:spLocks noGrp="1"/>
           </p:cNvSpPr>
@@ -2389,13 +2122,7 @@
       </p:sp>
       <p:sp>
         <p:nvSpPr>
-          <p:cNvPr id="6" name="Footer Placeholder 5">
-            <a:extLst>
-              <a:ext uri="{FF2B5EF4-FFF2-40B4-BE49-F238E27FC236}">
-                <a16:creationId xmlns:a16="http://schemas.microsoft.com/office/drawing/2014/main" id="{4D601129-E0D8-6CAD-42AA-4586D6E1BC1E}"/>
-              </a:ext>
-            </a:extLst>
-          </p:cNvPr>
+          <p:cNvPr id="6" name="Footer Placeholder 5"/>
           <p:cNvSpPr>
             <a:spLocks noGrp="1"/>
           </p:cNvSpPr>
@@ -2414,13 +2141,7 @@
       </p:sp>
       <p:sp>
         <p:nvSpPr>
-          <p:cNvPr id="7" name="Slide Number Placeholder 6">
-            <a:extLst>
-              <a:ext uri="{FF2B5EF4-FFF2-40B4-BE49-F238E27FC236}">
-                <a16:creationId xmlns:a16="http://schemas.microsoft.com/office/drawing/2014/main" id="{AEDB242B-7BA6-DC18-9FA4-DBE82A5FB618}"/>
-              </a:ext>
-            </a:extLst>
-          </p:cNvPr>
+          <p:cNvPr id="7" name="Slide Number Placeholder 6"/>
           <p:cNvSpPr>
             <a:spLocks noGrp="1"/>
           </p:cNvSpPr>
@@ -2444,7 +2165,7 @@
     </p:spTree>
     <p:extLst>
       <p:ext uri="{BB962C8B-B14F-4D97-AF65-F5344CB8AC3E}">
-        <p14:creationId xmlns:p14="http://schemas.microsoft.com/office/powerpoint/2010/main" val="3401900404"/>
+        <p14:creationId xmlns:p14="http://schemas.microsoft.com/office/powerpoint/2010/main" val="1857527980"/>
       </p:ext>
     </p:extLst>
   </p:cSld>
@@ -2473,13 +2194,7 @@
       </p:grpSpPr>
       <p:sp>
         <p:nvSpPr>
-          <p:cNvPr id="2" name="Title 1">
-            <a:extLst>
-              <a:ext uri="{FF2B5EF4-FFF2-40B4-BE49-F238E27FC236}">
-                <a16:creationId xmlns:a16="http://schemas.microsoft.com/office/drawing/2014/main" id="{E4042756-FDEE-1068-CC37-8CECA8E3FEC6}"/>
-              </a:ext>
-            </a:extLst>
-          </p:cNvPr>
+          <p:cNvPr id="2" name="Title 1"/>
           <p:cNvSpPr>
             <a:spLocks noGrp="1"/>
           </p:cNvSpPr>
@@ -2505,20 +2220,15 @@
               <a:rPr lang="en-US"/>
               <a:t>Click to edit Master title style</a:t>
             </a:r>
-          </a:p>
-        </p:txBody>
-      </p:sp>
-      <p:sp>
-        <p:nvSpPr>
-          <p:cNvPr id="3" name="Picture Placeholder 2">
-            <a:extLst>
-              <a:ext uri="{FF2B5EF4-FFF2-40B4-BE49-F238E27FC236}">
-                <a16:creationId xmlns:a16="http://schemas.microsoft.com/office/drawing/2014/main" id="{C146E67A-0C8A-3670-B315-3355C643274F}"/>
-              </a:ext>
-            </a:extLst>
-          </p:cNvPr>
-          <p:cNvSpPr>
-            <a:spLocks noGrp="1"/>
+            <a:endParaRPr lang="en-US" dirty="0"/>
+          </a:p>
+        </p:txBody>
+      </p:sp>
+      <p:sp>
+        <p:nvSpPr>
+          <p:cNvPr id="3" name="Picture Placeholder 2"/>
+          <p:cNvSpPr>
+            <a:spLocks noGrp="1" noChangeAspect="1"/>
           </p:cNvSpPr>
           <p:nvPr>
             <p:ph type="pic" idx="1"/>
@@ -2531,7 +2241,7 @@
           </a:xfrm>
         </p:spPr>
         <p:txBody>
-          <a:bodyPr/>
+          <a:bodyPr anchor="t"/>
           <a:lstStyle>
             <a:lvl1pPr marL="0" indent="0">
               <a:buNone/>
@@ -2571,19 +2281,17 @@
             </a:lvl9pPr>
           </a:lstStyle>
           <a:p>
-            <a:endParaRPr lang="en-US"/>
-          </a:p>
-        </p:txBody>
-      </p:sp>
-      <p:sp>
-        <p:nvSpPr>
-          <p:cNvPr id="4" name="Text Placeholder 3">
-            <a:extLst>
-              <a:ext uri="{FF2B5EF4-FFF2-40B4-BE49-F238E27FC236}">
-                <a16:creationId xmlns:a16="http://schemas.microsoft.com/office/drawing/2014/main" id="{6D18EC1D-E8C3-C936-1A92-BABAEA86230C}"/>
-              </a:ext>
-            </a:extLst>
-          </p:cNvPr>
+            <a:r>
+              <a:rPr lang="en-US"/>
+              <a:t>Click icon to add picture</a:t>
+            </a:r>
+            <a:endParaRPr lang="en-US" dirty="0"/>
+          </a:p>
+        </p:txBody>
+      </p:sp>
+      <p:sp>
+        <p:nvSpPr>
+          <p:cNvPr id="4" name="Text Placeholder 3"/>
           <p:cNvSpPr>
             <a:spLocks noGrp="1"/>
           </p:cNvSpPr>
@@ -2648,13 +2356,7 @@
       </p:sp>
       <p:sp>
         <p:nvSpPr>
-          <p:cNvPr id="5" name="Date Placeholder 4">
-            <a:extLst>
-              <a:ext uri="{FF2B5EF4-FFF2-40B4-BE49-F238E27FC236}">
-                <a16:creationId xmlns:a16="http://schemas.microsoft.com/office/drawing/2014/main" id="{EB01696D-0E82-7613-44A5-0B27BA03336C}"/>
-              </a:ext>
-            </a:extLst>
-          </p:cNvPr>
+          <p:cNvPr id="5" name="Date Placeholder 4"/>
           <p:cNvSpPr>
             <a:spLocks noGrp="1"/>
           </p:cNvSpPr>
@@ -2677,13 +2379,7 @@
       </p:sp>
       <p:sp>
         <p:nvSpPr>
-          <p:cNvPr id="6" name="Footer Placeholder 5">
-            <a:extLst>
-              <a:ext uri="{FF2B5EF4-FFF2-40B4-BE49-F238E27FC236}">
-                <a16:creationId xmlns:a16="http://schemas.microsoft.com/office/drawing/2014/main" id="{0BD021F5-CC90-6C3E-7159-B16264A6D54F}"/>
-              </a:ext>
-            </a:extLst>
-          </p:cNvPr>
+          <p:cNvPr id="6" name="Footer Placeholder 5"/>
           <p:cNvSpPr>
             <a:spLocks noGrp="1"/>
           </p:cNvSpPr>
@@ -2702,13 +2398,7 @@
       </p:sp>
       <p:sp>
         <p:nvSpPr>
-          <p:cNvPr id="7" name="Slide Number Placeholder 6">
-            <a:extLst>
-              <a:ext uri="{FF2B5EF4-FFF2-40B4-BE49-F238E27FC236}">
-                <a16:creationId xmlns:a16="http://schemas.microsoft.com/office/drawing/2014/main" id="{70DD2EB8-5097-3148-56D1-46DAEDC44747}"/>
-              </a:ext>
-            </a:extLst>
-          </p:cNvPr>
+          <p:cNvPr id="7" name="Slide Number Placeholder 6"/>
           <p:cNvSpPr>
             <a:spLocks noGrp="1"/>
           </p:cNvSpPr>
@@ -2732,7 +2422,7 @@
     </p:spTree>
     <p:extLst>
       <p:ext uri="{BB962C8B-B14F-4D97-AF65-F5344CB8AC3E}">
-        <p14:creationId xmlns:p14="http://schemas.microsoft.com/office/powerpoint/2010/main" val="4050998489"/>
+        <p14:creationId xmlns:p14="http://schemas.microsoft.com/office/powerpoint/2010/main" val="757366990"/>
       </p:ext>
     </p:extLst>
   </p:cSld>
@@ -2766,13 +2456,7 @@
       </p:grpSpPr>
       <p:sp>
         <p:nvSpPr>
-          <p:cNvPr id="2" name="Title Placeholder 1">
-            <a:extLst>
-              <a:ext uri="{FF2B5EF4-FFF2-40B4-BE49-F238E27FC236}">
-                <a16:creationId xmlns:a16="http://schemas.microsoft.com/office/drawing/2014/main" id="{2BE29763-8066-E445-BD1E-84C1FF7420B1}"/>
-              </a:ext>
-            </a:extLst>
-          </p:cNvPr>
+          <p:cNvPr id="2" name="Title Placeholder 1"/>
           <p:cNvSpPr>
             <a:spLocks noGrp="1"/>
           </p:cNvSpPr>
@@ -2799,18 +2483,13 @@
               <a:rPr lang="en-US"/>
               <a:t>Click to edit Master title style</a:t>
             </a:r>
-          </a:p>
-        </p:txBody>
-      </p:sp>
-      <p:sp>
-        <p:nvSpPr>
-          <p:cNvPr id="3" name="Text Placeholder 2">
-            <a:extLst>
-              <a:ext uri="{FF2B5EF4-FFF2-40B4-BE49-F238E27FC236}">
-                <a16:creationId xmlns:a16="http://schemas.microsoft.com/office/drawing/2014/main" id="{A5B49FDB-DB3D-39F3-7C03-27E5A559B8D0}"/>
-              </a:ext>
-            </a:extLst>
-          </p:cNvPr>
+            <a:endParaRPr lang="en-US" dirty="0"/>
+          </a:p>
+        </p:txBody>
+      </p:sp>
+      <p:sp>
+        <p:nvSpPr>
+          <p:cNvPr id="3" name="Text Placeholder 2"/>
           <p:cNvSpPr>
             <a:spLocks noGrp="1"/>
           </p:cNvSpPr>
@@ -2866,18 +2545,13 @@
               <a:rPr lang="en-US"/>
               <a:t>Fifth level</a:t>
             </a:r>
-          </a:p>
-        </p:txBody>
-      </p:sp>
-      <p:sp>
-        <p:nvSpPr>
-          <p:cNvPr id="4" name="Date Placeholder 3">
-            <a:extLst>
-              <a:ext uri="{FF2B5EF4-FFF2-40B4-BE49-F238E27FC236}">
-                <a16:creationId xmlns:a16="http://schemas.microsoft.com/office/drawing/2014/main" id="{6A84F425-4B0A-5844-FEFE-03B2CEAF59E9}"/>
-              </a:ext>
-            </a:extLst>
-          </p:cNvPr>
+            <a:endParaRPr lang="en-US" dirty="0"/>
+          </a:p>
+        </p:txBody>
+      </p:sp>
+      <p:sp>
+        <p:nvSpPr>
+          <p:cNvPr id="4" name="Date Placeholder 3"/>
           <p:cNvSpPr>
             <a:spLocks noGrp="1"/>
           </p:cNvSpPr>
@@ -2901,7 +2575,7 @@
               <a:defRPr sz="1200">
                 <a:solidFill>
                   <a:schemeClr val="tx1">
-                    <a:tint val="82000"/>
+                    <a:shade val="82000"/>
                   </a:schemeClr>
                 </a:solidFill>
               </a:defRPr>
@@ -2918,13 +2592,7 @@
       </p:sp>
       <p:sp>
         <p:nvSpPr>
-          <p:cNvPr id="5" name="Footer Placeholder 4">
-            <a:extLst>
-              <a:ext uri="{FF2B5EF4-FFF2-40B4-BE49-F238E27FC236}">
-                <a16:creationId xmlns:a16="http://schemas.microsoft.com/office/drawing/2014/main" id="{FF10EEE2-3106-27EB-E485-D26EDEA996C0}"/>
-              </a:ext>
-            </a:extLst>
-          </p:cNvPr>
+          <p:cNvPr id="5" name="Footer Placeholder 4"/>
           <p:cNvSpPr>
             <a:spLocks noGrp="1"/>
           </p:cNvSpPr>
@@ -2948,7 +2616,7 @@
               <a:defRPr sz="1200">
                 <a:solidFill>
                   <a:schemeClr val="tx1">
-                    <a:tint val="82000"/>
+                    <a:shade val="82000"/>
                   </a:schemeClr>
                 </a:solidFill>
               </a:defRPr>
@@ -2961,13 +2629,7 @@
       </p:sp>
       <p:sp>
         <p:nvSpPr>
-          <p:cNvPr id="6" name="Slide Number Placeholder 5">
-            <a:extLst>
-              <a:ext uri="{FF2B5EF4-FFF2-40B4-BE49-F238E27FC236}">
-                <a16:creationId xmlns:a16="http://schemas.microsoft.com/office/drawing/2014/main" id="{A39C7AD9-20CD-806C-CC9E-D145C3B97A63}"/>
-              </a:ext>
-            </a:extLst>
-          </p:cNvPr>
+          <p:cNvPr id="6" name="Slide Number Placeholder 5"/>
           <p:cNvSpPr>
             <a:spLocks noGrp="1"/>
           </p:cNvSpPr>
@@ -2991,7 +2653,7 @@
               <a:defRPr sz="1200">
                 <a:solidFill>
                   <a:schemeClr val="tx1">
-                    <a:tint val="82000"/>
+                    <a:shade val="82000"/>
                   </a:schemeClr>
                 </a:solidFill>
               </a:defRPr>
@@ -3009,23 +2671,23 @@
     </p:spTree>
     <p:extLst>
       <p:ext uri="{BB962C8B-B14F-4D97-AF65-F5344CB8AC3E}">
-        <p14:creationId xmlns:p14="http://schemas.microsoft.com/office/powerpoint/2010/main" val="2675918010"/>
+        <p14:creationId xmlns:p14="http://schemas.microsoft.com/office/powerpoint/2010/main" val="3811076304"/>
       </p:ext>
     </p:extLst>
   </p:cSld>
-  <p:clrMap bg1="lt1" tx1="dk1" bg2="lt2" tx2="dk2" accent1="accent1" accent2="accent2" accent3="accent3" accent4="accent4" accent5="accent5" accent6="accent6" hlink="hlink" folHlink="folHlink"/>
+  <p:clrMap bg1="dk1" tx1="lt1" bg2="dk2" tx2="lt2" accent1="accent1" accent2="accent2" accent3="accent3" accent4="accent4" accent5="accent5" accent6="accent6" hlink="hlink" folHlink="folHlink"/>
   <p:sldLayoutIdLst>
-    <p:sldLayoutId id="2147483649" r:id="rId1"/>
-    <p:sldLayoutId id="2147483650" r:id="rId2"/>
-    <p:sldLayoutId id="2147483651" r:id="rId3"/>
-    <p:sldLayoutId id="2147483652" r:id="rId4"/>
-    <p:sldLayoutId id="2147483653" r:id="rId5"/>
-    <p:sldLayoutId id="2147483654" r:id="rId6"/>
-    <p:sldLayoutId id="2147483655" r:id="rId7"/>
-    <p:sldLayoutId id="2147483656" r:id="rId8"/>
-    <p:sldLayoutId id="2147483657" r:id="rId9"/>
-    <p:sldLayoutId id="2147483658" r:id="rId10"/>
-    <p:sldLayoutId id="2147483659" r:id="rId11"/>
+    <p:sldLayoutId id="2147483661" r:id="rId1"/>
+    <p:sldLayoutId id="2147483662" r:id="rId2"/>
+    <p:sldLayoutId id="2147483663" r:id="rId3"/>
+    <p:sldLayoutId id="2147483664" r:id="rId4"/>
+    <p:sldLayoutId id="2147483665" r:id="rId5"/>
+    <p:sldLayoutId id="2147483666" r:id="rId6"/>
+    <p:sldLayoutId id="2147483667" r:id="rId7"/>
+    <p:sldLayoutId id="2147483668" r:id="rId8"/>
+    <p:sldLayoutId id="2147483669" r:id="rId9"/>
+    <p:sldLayoutId id="2147483670" r:id="rId10"/>
+    <p:sldLayoutId id="2147483671" r:id="rId11"/>
   </p:sldLayoutIdLst>
   <p:txStyles>
     <p:titleStyle>
@@ -3429,7 +3091,12 @@
             <p:ph type="ctrTitle"/>
           </p:nvPr>
         </p:nvSpPr>
-        <p:spPr/>
+        <p:spPr>
+          <a:xfrm>
+            <a:off x="1524000" y="226251"/>
+            <a:ext cx="9144000" cy="944181"/>
+          </a:xfrm>
+        </p:spPr>
         <p:txBody>
           <a:bodyPr>
             <a:normAutofit fontScale="90000"/>
@@ -3440,10 +3107,6 @@
               <a:rPr lang="en-US" dirty="0"/>
               <a:t>Summarize refined game target</a:t>
             </a:r>
-            <a:br>
-              <a:rPr lang="en-US" dirty="0"/>
-            </a:br>
-            <a:endParaRPr lang="en-US" dirty="0"/>
           </a:p>
         </p:txBody>
       </p:sp>
@@ -3524,7 +3187,12 @@
             <p:ph type="ctrTitle"/>
           </p:nvPr>
         </p:nvSpPr>
-        <p:spPr/>
+        <p:spPr>
+          <a:xfrm>
+            <a:off x="1524000" y="169863"/>
+            <a:ext cx="9144000" cy="1001712"/>
+          </a:xfrm>
+        </p:spPr>
         <p:txBody>
           <a:bodyPr/>
           <a:lstStyle/>
@@ -3615,8 +3283,8 @@
         </p:nvSpPr>
         <p:spPr>
           <a:xfrm>
-            <a:off x="1524000" y="0"/>
-            <a:ext cx="9144000" cy="2387600"/>
+            <a:off x="1524000" y="142874"/>
+            <a:ext cx="9144000" cy="1882775"/>
           </a:xfrm>
         </p:spPr>
         <p:txBody>
@@ -3648,18 +3316,67 @@
         </p:nvSpPr>
         <p:spPr>
           <a:xfrm>
-            <a:off x="1524000" y="2814639"/>
-            <a:ext cx="9144000" cy="1655762"/>
+            <a:off x="137160" y="2814639"/>
+            <a:ext cx="7872984" cy="1655762"/>
           </a:xfrm>
         </p:spPr>
         <p:txBody>
-          <a:bodyPr/>
-          <a:lstStyle/>
-          <a:p>
-            <a:endParaRPr lang="en-US" dirty="0"/>
-          </a:p>
-        </p:txBody>
-      </p:sp>
+          <a:bodyPr>
+            <a:normAutofit/>
+          </a:bodyPr>
+          <a:lstStyle/>
+          <a:p>
+            <a:pPr marL="342900" indent="-342900">
+              <a:buFontTx/>
+              <a:buChar char="-"/>
+            </a:pPr>
+            <a:r>
+              <a:rPr lang="en-US" dirty="0"/>
+              <a:t>Everything document wise is stored in the repo.</a:t>
+            </a:r>
+          </a:p>
+          <a:p>
+            <a:pPr marL="342900" indent="-342900">
+              <a:buFontTx/>
+              <a:buChar char="-"/>
+            </a:pPr>
+            <a:r>
+              <a:rPr lang="en-US" dirty="0"/>
+              <a:t>Everything is updated as of recent.</a:t>
+            </a:r>
+          </a:p>
+        </p:txBody>
+      </p:sp>
+      <p:pic>
+        <p:nvPicPr>
+          <p:cNvPr id="5" name="Picture 4">
+            <a:extLst>
+              <a:ext uri="{FF2B5EF4-FFF2-40B4-BE49-F238E27FC236}">
+                <a16:creationId xmlns:a16="http://schemas.microsoft.com/office/drawing/2014/main" id="{1BDA3EF0-BDE3-3A8B-FE68-C9707639A5D8}"/>
+              </a:ext>
+            </a:extLst>
+          </p:cNvPr>
+          <p:cNvPicPr>
+            <a:picLocks noChangeAspect="1"/>
+          </p:cNvPicPr>
+          <p:nvPr/>
+        </p:nvPicPr>
+        <p:blipFill>
+          <a:blip r:embed="rId2"/>
+          <a:stretch>
+            <a:fillRect/>
+          </a:stretch>
+        </p:blipFill>
+        <p:spPr>
+          <a:xfrm>
+            <a:off x="8314997" y="2814639"/>
+            <a:ext cx="2353003" cy="3362794"/>
+          </a:xfrm>
+          <a:prstGeom prst="rect">
+            <a:avLst/>
+          </a:prstGeom>
+        </p:spPr>
+      </p:pic>
     </p:spTree>
     <p:extLst>
       <p:ext uri="{BB962C8B-B14F-4D97-AF65-F5344CB8AC3E}">
@@ -3747,12 +3464,1123 @@
             <p:ph type="subTitle" idx="1"/>
           </p:nvPr>
         </p:nvSpPr>
-        <p:spPr/>
-        <p:txBody>
-          <a:bodyPr/>
-          <a:lstStyle/>
-          <a:p>
-            <a:endParaRPr lang="en-US"/>
+        <p:spPr>
+          <a:xfrm>
+            <a:off x="1005840" y="1744853"/>
+            <a:ext cx="4733544" cy="3019171"/>
+          </a:xfrm>
+        </p:spPr>
+        <p:txBody>
+          <a:bodyPr>
+            <a:noAutofit/>
+          </a:bodyPr>
+          <a:lstStyle/>
+          <a:p>
+            <a:pPr algn="l"/>
+            <a:r>
+              <a:rPr lang="en-CA" sz="2000" dirty="0"/>
+              <a:t>Company Quota System (1 week)</a:t>
+            </a:r>
+          </a:p>
+          <a:p>
+            <a:pPr algn="l"/>
+            <a:r>
+              <a:rPr lang="en-CA" sz="2000" dirty="0"/>
+              <a:t>Streaming System (1-2 weeks)</a:t>
+            </a:r>
+            <a:endParaRPr lang="en-US" sz="2000" dirty="0"/>
+          </a:p>
+          <a:p>
+            <a:pPr algn="l"/>
+            <a:r>
+              <a:rPr lang="en-CA" sz="2000" dirty="0"/>
+              <a:t>Real Life / Apartment Area (1-2 weeks)</a:t>
+            </a:r>
+            <a:endParaRPr lang="en-US" sz="2000" dirty="0"/>
+          </a:p>
+          <a:p>
+            <a:pPr algn="l"/>
+            <a:r>
+              <a:rPr lang="en-CA" sz="2000" dirty="0"/>
+              <a:t>Stream Chat System (1-2 weeks)</a:t>
+            </a:r>
+          </a:p>
+          <a:p>
+            <a:pPr algn="l"/>
+            <a:r>
+              <a:rPr lang="en-CA" sz="2000" dirty="0"/>
+              <a:t>Stream decisions/setup (1-2 weeks)</a:t>
+            </a:r>
+            <a:endParaRPr lang="en-US" sz="2000" dirty="0"/>
+          </a:p>
+          <a:p>
+            <a:pPr algn="l"/>
+            <a:r>
+              <a:rPr lang="en-CA" sz="2000" dirty="0"/>
+              <a:t>Rent / Expenses and revenue (1-2 weeks)</a:t>
+            </a:r>
+            <a:endParaRPr lang="en-US" sz="2000" dirty="0"/>
+          </a:p>
+          <a:p>
+            <a:pPr algn="l"/>
+            <a:r>
+              <a:rPr lang="en-CA" sz="2000" dirty="0"/>
+              <a:t>Collab System and Socialization (1-3 weeks)</a:t>
+            </a:r>
+          </a:p>
+          <a:p>
+            <a:pPr algn="l"/>
+            <a:endParaRPr lang="en-CA" sz="2000" dirty="0"/>
+          </a:p>
+        </p:txBody>
+      </p:sp>
+      <p:sp>
+        <p:nvSpPr>
+          <p:cNvPr id="4" name="Subtitle 2">
+            <a:extLst>
+              <a:ext uri="{FF2B5EF4-FFF2-40B4-BE49-F238E27FC236}">
+                <a16:creationId xmlns:a16="http://schemas.microsoft.com/office/drawing/2014/main" id="{110276F4-92DF-D503-DB93-FB648EECED29}"/>
+              </a:ext>
+            </a:extLst>
+          </p:cNvPr>
+          <p:cNvSpPr txBox="1">
+            <a:spLocks/>
+          </p:cNvSpPr>
+          <p:nvPr/>
+        </p:nvSpPr>
+        <p:spPr>
+          <a:xfrm>
+            <a:off x="6452616" y="1856232"/>
+            <a:ext cx="4733544" cy="2203704"/>
+          </a:xfrm>
+          <a:prstGeom prst="rect">
+            <a:avLst/>
+          </a:prstGeom>
+        </p:spPr>
+        <p:txBody>
+          <a:bodyPr vert="horz" lIns="91440" tIns="45720" rIns="91440" bIns="45720" rtlCol="0">
+            <a:normAutofit/>
+          </a:bodyPr>
+          <a:lstStyle>
+            <a:lvl1pPr marL="0" indent="0" algn="ctr" defTabSz="914400" rtl="0" eaLnBrk="1" latinLnBrk="0" hangingPunct="1">
+              <a:lnSpc>
+                <a:spcPct val="90000"/>
+              </a:lnSpc>
+              <a:spcBef>
+                <a:spcPts val="1000"/>
+              </a:spcBef>
+              <a:buFont typeface="Arial" panose="020B0604020202020204" pitchFamily="34" charset="0"/>
+              <a:buNone/>
+              <a:defRPr sz="2400" kern="1200">
+                <a:solidFill>
+                  <a:schemeClr val="tx1"/>
+                </a:solidFill>
+                <a:latin typeface="+mn-lt"/>
+                <a:ea typeface="+mn-ea"/>
+                <a:cs typeface="+mn-cs"/>
+              </a:defRPr>
+            </a:lvl1pPr>
+            <a:lvl2pPr marL="457200" indent="0" algn="ctr" defTabSz="914400" rtl="0" eaLnBrk="1" latinLnBrk="0" hangingPunct="1">
+              <a:lnSpc>
+                <a:spcPct val="90000"/>
+              </a:lnSpc>
+              <a:spcBef>
+                <a:spcPts val="500"/>
+              </a:spcBef>
+              <a:buFont typeface="Arial" panose="020B0604020202020204" pitchFamily="34" charset="0"/>
+              <a:buNone/>
+              <a:defRPr sz="2000" kern="1200">
+                <a:solidFill>
+                  <a:schemeClr val="tx1"/>
+                </a:solidFill>
+                <a:latin typeface="+mn-lt"/>
+                <a:ea typeface="+mn-ea"/>
+                <a:cs typeface="+mn-cs"/>
+              </a:defRPr>
+            </a:lvl2pPr>
+            <a:lvl3pPr marL="914400" indent="0" algn="ctr" defTabSz="914400" rtl="0" eaLnBrk="1" latinLnBrk="0" hangingPunct="1">
+              <a:lnSpc>
+                <a:spcPct val="90000"/>
+              </a:lnSpc>
+              <a:spcBef>
+                <a:spcPts val="500"/>
+              </a:spcBef>
+              <a:buFont typeface="Arial" panose="020B0604020202020204" pitchFamily="34" charset="0"/>
+              <a:buNone/>
+              <a:defRPr sz="1800" kern="1200">
+                <a:solidFill>
+                  <a:schemeClr val="tx1"/>
+                </a:solidFill>
+                <a:latin typeface="+mn-lt"/>
+                <a:ea typeface="+mn-ea"/>
+                <a:cs typeface="+mn-cs"/>
+              </a:defRPr>
+            </a:lvl3pPr>
+            <a:lvl4pPr marL="1371600" indent="0" algn="ctr" defTabSz="914400" rtl="0" eaLnBrk="1" latinLnBrk="0" hangingPunct="1">
+              <a:lnSpc>
+                <a:spcPct val="90000"/>
+              </a:lnSpc>
+              <a:spcBef>
+                <a:spcPts val="500"/>
+              </a:spcBef>
+              <a:buFont typeface="Arial" panose="020B0604020202020204" pitchFamily="34" charset="0"/>
+              <a:buNone/>
+              <a:defRPr sz="1600" kern="1200">
+                <a:solidFill>
+                  <a:schemeClr val="tx1"/>
+                </a:solidFill>
+                <a:latin typeface="+mn-lt"/>
+                <a:ea typeface="+mn-ea"/>
+                <a:cs typeface="+mn-cs"/>
+              </a:defRPr>
+            </a:lvl4pPr>
+            <a:lvl5pPr marL="1828800" indent="0" algn="ctr" defTabSz="914400" rtl="0" eaLnBrk="1" latinLnBrk="0" hangingPunct="1">
+              <a:lnSpc>
+                <a:spcPct val="90000"/>
+              </a:lnSpc>
+              <a:spcBef>
+                <a:spcPts val="500"/>
+              </a:spcBef>
+              <a:buFont typeface="Arial" panose="020B0604020202020204" pitchFamily="34" charset="0"/>
+              <a:buNone/>
+              <a:defRPr sz="1600" kern="1200">
+                <a:solidFill>
+                  <a:schemeClr val="tx1"/>
+                </a:solidFill>
+                <a:latin typeface="+mn-lt"/>
+                <a:ea typeface="+mn-ea"/>
+                <a:cs typeface="+mn-cs"/>
+              </a:defRPr>
+            </a:lvl5pPr>
+            <a:lvl6pPr marL="2286000" indent="0" algn="ctr" defTabSz="914400" rtl="0" eaLnBrk="1" latinLnBrk="0" hangingPunct="1">
+              <a:lnSpc>
+                <a:spcPct val="90000"/>
+              </a:lnSpc>
+              <a:spcBef>
+                <a:spcPts val="500"/>
+              </a:spcBef>
+              <a:buFont typeface="Arial" panose="020B0604020202020204" pitchFamily="34" charset="0"/>
+              <a:buNone/>
+              <a:defRPr sz="1600" kern="1200">
+                <a:solidFill>
+                  <a:schemeClr val="tx1"/>
+                </a:solidFill>
+                <a:latin typeface="+mn-lt"/>
+                <a:ea typeface="+mn-ea"/>
+                <a:cs typeface="+mn-cs"/>
+              </a:defRPr>
+            </a:lvl6pPr>
+            <a:lvl7pPr marL="2743200" indent="0" algn="ctr" defTabSz="914400" rtl="0" eaLnBrk="1" latinLnBrk="0" hangingPunct="1">
+              <a:lnSpc>
+                <a:spcPct val="90000"/>
+              </a:lnSpc>
+              <a:spcBef>
+                <a:spcPts val="500"/>
+              </a:spcBef>
+              <a:buFont typeface="Arial" panose="020B0604020202020204" pitchFamily="34" charset="0"/>
+              <a:buNone/>
+              <a:defRPr sz="1600" kern="1200">
+                <a:solidFill>
+                  <a:schemeClr val="tx1"/>
+                </a:solidFill>
+                <a:latin typeface="+mn-lt"/>
+                <a:ea typeface="+mn-ea"/>
+                <a:cs typeface="+mn-cs"/>
+              </a:defRPr>
+            </a:lvl7pPr>
+            <a:lvl8pPr marL="3200400" indent="0" algn="ctr" defTabSz="914400" rtl="0" eaLnBrk="1" latinLnBrk="0" hangingPunct="1">
+              <a:lnSpc>
+                <a:spcPct val="90000"/>
+              </a:lnSpc>
+              <a:spcBef>
+                <a:spcPts val="500"/>
+              </a:spcBef>
+              <a:buFont typeface="Arial" panose="020B0604020202020204" pitchFamily="34" charset="0"/>
+              <a:buNone/>
+              <a:defRPr sz="1600" kern="1200">
+                <a:solidFill>
+                  <a:schemeClr val="tx1"/>
+                </a:solidFill>
+                <a:latin typeface="+mn-lt"/>
+                <a:ea typeface="+mn-ea"/>
+                <a:cs typeface="+mn-cs"/>
+              </a:defRPr>
+            </a:lvl8pPr>
+            <a:lvl9pPr marL="3657600" indent="0" algn="ctr" defTabSz="914400" rtl="0" eaLnBrk="1" latinLnBrk="0" hangingPunct="1">
+              <a:lnSpc>
+                <a:spcPct val="90000"/>
+              </a:lnSpc>
+              <a:spcBef>
+                <a:spcPts val="500"/>
+              </a:spcBef>
+              <a:buFont typeface="Arial" panose="020B0604020202020204" pitchFamily="34" charset="0"/>
+              <a:buNone/>
+              <a:defRPr sz="1600" kern="1200">
+                <a:solidFill>
+                  <a:schemeClr val="tx1"/>
+                </a:solidFill>
+                <a:latin typeface="+mn-lt"/>
+                <a:ea typeface="+mn-ea"/>
+                <a:cs typeface="+mn-cs"/>
+              </a:defRPr>
+            </a:lvl9pPr>
+          </a:lstStyle>
+          <a:p>
+            <a:pPr algn="l"/>
+            <a:r>
+              <a:rPr lang="en-CA" sz="2000" dirty="0"/>
+              <a:t>3D </a:t>
+            </a:r>
+            <a:r>
+              <a:rPr lang="en-CA" sz="2000" dirty="0" err="1"/>
+              <a:t>Vtuber</a:t>
+            </a:r>
+            <a:r>
+              <a:rPr lang="en-CA" sz="2000" dirty="0"/>
+              <a:t> Models (1-4 weeks)</a:t>
+            </a:r>
+          </a:p>
+          <a:p>
+            <a:pPr algn="l"/>
+            <a:r>
+              <a:rPr lang="en-CA" sz="2000" dirty="0"/>
+              <a:t>Streaming UI (1 week)</a:t>
+            </a:r>
+            <a:endParaRPr lang="en-US" sz="2000" dirty="0"/>
+          </a:p>
+          <a:p>
+            <a:pPr algn="l"/>
+            <a:r>
+              <a:rPr lang="en-CA" sz="2000" dirty="0"/>
+              <a:t>Apartment Area Models (1-4 weeks)</a:t>
+            </a:r>
+            <a:endParaRPr lang="en-US" sz="2000" dirty="0"/>
+          </a:p>
+          <a:p>
+            <a:pPr algn="l"/>
+            <a:r>
+              <a:rPr lang="en-US" sz="2000" dirty="0"/>
+              <a:t>2D </a:t>
+            </a:r>
+            <a:r>
+              <a:rPr lang="en-US" sz="2000" dirty="0" err="1"/>
+              <a:t>Vtuber</a:t>
+            </a:r>
+            <a:r>
+              <a:rPr lang="en-US" sz="2000" dirty="0"/>
+              <a:t> Art (1-4 weeks)</a:t>
+            </a:r>
+          </a:p>
+        </p:txBody>
+      </p:sp>
+      <p:sp>
+        <p:nvSpPr>
+          <p:cNvPr id="5" name="Subtitle 2">
+            <a:extLst>
+              <a:ext uri="{FF2B5EF4-FFF2-40B4-BE49-F238E27FC236}">
+                <a16:creationId xmlns:a16="http://schemas.microsoft.com/office/drawing/2014/main" id="{AC9F6C2F-F2FF-FDE9-59D1-0026200B6504}"/>
+              </a:ext>
+            </a:extLst>
+          </p:cNvPr>
+          <p:cNvSpPr txBox="1">
+            <a:spLocks/>
+          </p:cNvSpPr>
+          <p:nvPr/>
+        </p:nvSpPr>
+        <p:spPr>
+          <a:xfrm>
+            <a:off x="1005840" y="1289304"/>
+            <a:ext cx="4733544" cy="420624"/>
+          </a:xfrm>
+          <a:prstGeom prst="rect">
+            <a:avLst/>
+          </a:prstGeom>
+        </p:spPr>
+        <p:txBody>
+          <a:bodyPr vert="horz" lIns="91440" tIns="45720" rIns="91440" bIns="45720" rtlCol="0">
+            <a:normAutofit lnSpcReduction="10000"/>
+          </a:bodyPr>
+          <a:lstStyle>
+            <a:lvl1pPr marL="0" indent="0" algn="ctr" defTabSz="914400" rtl="0" eaLnBrk="1" latinLnBrk="0" hangingPunct="1">
+              <a:lnSpc>
+                <a:spcPct val="90000"/>
+              </a:lnSpc>
+              <a:spcBef>
+                <a:spcPts val="1000"/>
+              </a:spcBef>
+              <a:buFont typeface="Arial" panose="020B0604020202020204" pitchFamily="34" charset="0"/>
+              <a:buNone/>
+              <a:defRPr sz="2400" kern="1200">
+                <a:solidFill>
+                  <a:schemeClr val="tx1"/>
+                </a:solidFill>
+                <a:latin typeface="+mn-lt"/>
+                <a:ea typeface="+mn-ea"/>
+                <a:cs typeface="+mn-cs"/>
+              </a:defRPr>
+            </a:lvl1pPr>
+            <a:lvl2pPr marL="457200" indent="0" algn="ctr" defTabSz="914400" rtl="0" eaLnBrk="1" latinLnBrk="0" hangingPunct="1">
+              <a:lnSpc>
+                <a:spcPct val="90000"/>
+              </a:lnSpc>
+              <a:spcBef>
+                <a:spcPts val="500"/>
+              </a:spcBef>
+              <a:buFont typeface="Arial" panose="020B0604020202020204" pitchFamily="34" charset="0"/>
+              <a:buNone/>
+              <a:defRPr sz="2000" kern="1200">
+                <a:solidFill>
+                  <a:schemeClr val="tx1"/>
+                </a:solidFill>
+                <a:latin typeface="+mn-lt"/>
+                <a:ea typeface="+mn-ea"/>
+                <a:cs typeface="+mn-cs"/>
+              </a:defRPr>
+            </a:lvl2pPr>
+            <a:lvl3pPr marL="914400" indent="0" algn="ctr" defTabSz="914400" rtl="0" eaLnBrk="1" latinLnBrk="0" hangingPunct="1">
+              <a:lnSpc>
+                <a:spcPct val="90000"/>
+              </a:lnSpc>
+              <a:spcBef>
+                <a:spcPts val="500"/>
+              </a:spcBef>
+              <a:buFont typeface="Arial" panose="020B0604020202020204" pitchFamily="34" charset="0"/>
+              <a:buNone/>
+              <a:defRPr sz="1800" kern="1200">
+                <a:solidFill>
+                  <a:schemeClr val="tx1"/>
+                </a:solidFill>
+                <a:latin typeface="+mn-lt"/>
+                <a:ea typeface="+mn-ea"/>
+                <a:cs typeface="+mn-cs"/>
+              </a:defRPr>
+            </a:lvl3pPr>
+            <a:lvl4pPr marL="1371600" indent="0" algn="ctr" defTabSz="914400" rtl="0" eaLnBrk="1" latinLnBrk="0" hangingPunct="1">
+              <a:lnSpc>
+                <a:spcPct val="90000"/>
+              </a:lnSpc>
+              <a:spcBef>
+                <a:spcPts val="500"/>
+              </a:spcBef>
+              <a:buFont typeface="Arial" panose="020B0604020202020204" pitchFamily="34" charset="0"/>
+              <a:buNone/>
+              <a:defRPr sz="1600" kern="1200">
+                <a:solidFill>
+                  <a:schemeClr val="tx1"/>
+                </a:solidFill>
+                <a:latin typeface="+mn-lt"/>
+                <a:ea typeface="+mn-ea"/>
+                <a:cs typeface="+mn-cs"/>
+              </a:defRPr>
+            </a:lvl4pPr>
+            <a:lvl5pPr marL="1828800" indent="0" algn="ctr" defTabSz="914400" rtl="0" eaLnBrk="1" latinLnBrk="0" hangingPunct="1">
+              <a:lnSpc>
+                <a:spcPct val="90000"/>
+              </a:lnSpc>
+              <a:spcBef>
+                <a:spcPts val="500"/>
+              </a:spcBef>
+              <a:buFont typeface="Arial" panose="020B0604020202020204" pitchFamily="34" charset="0"/>
+              <a:buNone/>
+              <a:defRPr sz="1600" kern="1200">
+                <a:solidFill>
+                  <a:schemeClr val="tx1"/>
+                </a:solidFill>
+                <a:latin typeface="+mn-lt"/>
+                <a:ea typeface="+mn-ea"/>
+                <a:cs typeface="+mn-cs"/>
+              </a:defRPr>
+            </a:lvl5pPr>
+            <a:lvl6pPr marL="2286000" indent="0" algn="ctr" defTabSz="914400" rtl="0" eaLnBrk="1" latinLnBrk="0" hangingPunct="1">
+              <a:lnSpc>
+                <a:spcPct val="90000"/>
+              </a:lnSpc>
+              <a:spcBef>
+                <a:spcPts val="500"/>
+              </a:spcBef>
+              <a:buFont typeface="Arial" panose="020B0604020202020204" pitchFamily="34" charset="0"/>
+              <a:buNone/>
+              <a:defRPr sz="1600" kern="1200">
+                <a:solidFill>
+                  <a:schemeClr val="tx1"/>
+                </a:solidFill>
+                <a:latin typeface="+mn-lt"/>
+                <a:ea typeface="+mn-ea"/>
+                <a:cs typeface="+mn-cs"/>
+              </a:defRPr>
+            </a:lvl6pPr>
+            <a:lvl7pPr marL="2743200" indent="0" algn="ctr" defTabSz="914400" rtl="0" eaLnBrk="1" latinLnBrk="0" hangingPunct="1">
+              <a:lnSpc>
+                <a:spcPct val="90000"/>
+              </a:lnSpc>
+              <a:spcBef>
+                <a:spcPts val="500"/>
+              </a:spcBef>
+              <a:buFont typeface="Arial" panose="020B0604020202020204" pitchFamily="34" charset="0"/>
+              <a:buNone/>
+              <a:defRPr sz="1600" kern="1200">
+                <a:solidFill>
+                  <a:schemeClr val="tx1"/>
+                </a:solidFill>
+                <a:latin typeface="+mn-lt"/>
+                <a:ea typeface="+mn-ea"/>
+                <a:cs typeface="+mn-cs"/>
+              </a:defRPr>
+            </a:lvl7pPr>
+            <a:lvl8pPr marL="3200400" indent="0" algn="ctr" defTabSz="914400" rtl="0" eaLnBrk="1" latinLnBrk="0" hangingPunct="1">
+              <a:lnSpc>
+                <a:spcPct val="90000"/>
+              </a:lnSpc>
+              <a:spcBef>
+                <a:spcPts val="500"/>
+              </a:spcBef>
+              <a:buFont typeface="Arial" panose="020B0604020202020204" pitchFamily="34" charset="0"/>
+              <a:buNone/>
+              <a:defRPr sz="1600" kern="1200">
+                <a:solidFill>
+                  <a:schemeClr val="tx1"/>
+                </a:solidFill>
+                <a:latin typeface="+mn-lt"/>
+                <a:ea typeface="+mn-ea"/>
+                <a:cs typeface="+mn-cs"/>
+              </a:defRPr>
+            </a:lvl8pPr>
+            <a:lvl9pPr marL="3657600" indent="0" algn="ctr" defTabSz="914400" rtl="0" eaLnBrk="1" latinLnBrk="0" hangingPunct="1">
+              <a:lnSpc>
+                <a:spcPct val="90000"/>
+              </a:lnSpc>
+              <a:spcBef>
+                <a:spcPts val="500"/>
+              </a:spcBef>
+              <a:buFont typeface="Arial" panose="020B0604020202020204" pitchFamily="34" charset="0"/>
+              <a:buNone/>
+              <a:defRPr sz="1600" kern="1200">
+                <a:solidFill>
+                  <a:schemeClr val="tx1"/>
+                </a:solidFill>
+                <a:latin typeface="+mn-lt"/>
+                <a:ea typeface="+mn-ea"/>
+                <a:cs typeface="+mn-cs"/>
+              </a:defRPr>
+            </a:lvl9pPr>
+          </a:lstStyle>
+          <a:p>
+            <a:pPr algn="l"/>
+            <a:r>
+              <a:rPr lang="en-US" dirty="0"/>
+              <a:t>Programming</a:t>
+            </a:r>
+          </a:p>
+        </p:txBody>
+      </p:sp>
+      <p:sp>
+        <p:nvSpPr>
+          <p:cNvPr id="7" name="Subtitle 2">
+            <a:extLst>
+              <a:ext uri="{FF2B5EF4-FFF2-40B4-BE49-F238E27FC236}">
+                <a16:creationId xmlns:a16="http://schemas.microsoft.com/office/drawing/2014/main" id="{0F0550A2-85CC-D96C-79F7-61D32D2D8FDD}"/>
+              </a:ext>
+            </a:extLst>
+          </p:cNvPr>
+          <p:cNvSpPr txBox="1">
+            <a:spLocks/>
+          </p:cNvSpPr>
+          <p:nvPr/>
+        </p:nvSpPr>
+        <p:spPr>
+          <a:xfrm>
+            <a:off x="6452618" y="1281811"/>
+            <a:ext cx="4733544" cy="420624"/>
+          </a:xfrm>
+          <a:prstGeom prst="rect">
+            <a:avLst/>
+          </a:prstGeom>
+        </p:spPr>
+        <p:txBody>
+          <a:bodyPr vert="horz" lIns="91440" tIns="45720" rIns="91440" bIns="45720" rtlCol="0">
+            <a:normAutofit lnSpcReduction="10000"/>
+          </a:bodyPr>
+          <a:lstStyle>
+            <a:lvl1pPr marL="0" indent="0" algn="ctr" defTabSz="914400" rtl="0" eaLnBrk="1" latinLnBrk="0" hangingPunct="1">
+              <a:lnSpc>
+                <a:spcPct val="90000"/>
+              </a:lnSpc>
+              <a:spcBef>
+                <a:spcPts val="1000"/>
+              </a:spcBef>
+              <a:buFont typeface="Arial" panose="020B0604020202020204" pitchFamily="34" charset="0"/>
+              <a:buNone/>
+              <a:defRPr sz="2400" kern="1200">
+                <a:solidFill>
+                  <a:schemeClr val="tx1"/>
+                </a:solidFill>
+                <a:latin typeface="+mn-lt"/>
+                <a:ea typeface="+mn-ea"/>
+                <a:cs typeface="+mn-cs"/>
+              </a:defRPr>
+            </a:lvl1pPr>
+            <a:lvl2pPr marL="457200" indent="0" algn="ctr" defTabSz="914400" rtl="0" eaLnBrk="1" latinLnBrk="0" hangingPunct="1">
+              <a:lnSpc>
+                <a:spcPct val="90000"/>
+              </a:lnSpc>
+              <a:spcBef>
+                <a:spcPts val="500"/>
+              </a:spcBef>
+              <a:buFont typeface="Arial" panose="020B0604020202020204" pitchFamily="34" charset="0"/>
+              <a:buNone/>
+              <a:defRPr sz="2000" kern="1200">
+                <a:solidFill>
+                  <a:schemeClr val="tx1"/>
+                </a:solidFill>
+                <a:latin typeface="+mn-lt"/>
+                <a:ea typeface="+mn-ea"/>
+                <a:cs typeface="+mn-cs"/>
+              </a:defRPr>
+            </a:lvl2pPr>
+            <a:lvl3pPr marL="914400" indent="0" algn="ctr" defTabSz="914400" rtl="0" eaLnBrk="1" latinLnBrk="0" hangingPunct="1">
+              <a:lnSpc>
+                <a:spcPct val="90000"/>
+              </a:lnSpc>
+              <a:spcBef>
+                <a:spcPts val="500"/>
+              </a:spcBef>
+              <a:buFont typeface="Arial" panose="020B0604020202020204" pitchFamily="34" charset="0"/>
+              <a:buNone/>
+              <a:defRPr sz="1800" kern="1200">
+                <a:solidFill>
+                  <a:schemeClr val="tx1"/>
+                </a:solidFill>
+                <a:latin typeface="+mn-lt"/>
+                <a:ea typeface="+mn-ea"/>
+                <a:cs typeface="+mn-cs"/>
+              </a:defRPr>
+            </a:lvl3pPr>
+            <a:lvl4pPr marL="1371600" indent="0" algn="ctr" defTabSz="914400" rtl="0" eaLnBrk="1" latinLnBrk="0" hangingPunct="1">
+              <a:lnSpc>
+                <a:spcPct val="90000"/>
+              </a:lnSpc>
+              <a:spcBef>
+                <a:spcPts val="500"/>
+              </a:spcBef>
+              <a:buFont typeface="Arial" panose="020B0604020202020204" pitchFamily="34" charset="0"/>
+              <a:buNone/>
+              <a:defRPr sz="1600" kern="1200">
+                <a:solidFill>
+                  <a:schemeClr val="tx1"/>
+                </a:solidFill>
+                <a:latin typeface="+mn-lt"/>
+                <a:ea typeface="+mn-ea"/>
+                <a:cs typeface="+mn-cs"/>
+              </a:defRPr>
+            </a:lvl4pPr>
+            <a:lvl5pPr marL="1828800" indent="0" algn="ctr" defTabSz="914400" rtl="0" eaLnBrk="1" latinLnBrk="0" hangingPunct="1">
+              <a:lnSpc>
+                <a:spcPct val="90000"/>
+              </a:lnSpc>
+              <a:spcBef>
+                <a:spcPts val="500"/>
+              </a:spcBef>
+              <a:buFont typeface="Arial" panose="020B0604020202020204" pitchFamily="34" charset="0"/>
+              <a:buNone/>
+              <a:defRPr sz="1600" kern="1200">
+                <a:solidFill>
+                  <a:schemeClr val="tx1"/>
+                </a:solidFill>
+                <a:latin typeface="+mn-lt"/>
+                <a:ea typeface="+mn-ea"/>
+                <a:cs typeface="+mn-cs"/>
+              </a:defRPr>
+            </a:lvl5pPr>
+            <a:lvl6pPr marL="2286000" indent="0" algn="ctr" defTabSz="914400" rtl="0" eaLnBrk="1" latinLnBrk="0" hangingPunct="1">
+              <a:lnSpc>
+                <a:spcPct val="90000"/>
+              </a:lnSpc>
+              <a:spcBef>
+                <a:spcPts val="500"/>
+              </a:spcBef>
+              <a:buFont typeface="Arial" panose="020B0604020202020204" pitchFamily="34" charset="0"/>
+              <a:buNone/>
+              <a:defRPr sz="1600" kern="1200">
+                <a:solidFill>
+                  <a:schemeClr val="tx1"/>
+                </a:solidFill>
+                <a:latin typeface="+mn-lt"/>
+                <a:ea typeface="+mn-ea"/>
+                <a:cs typeface="+mn-cs"/>
+              </a:defRPr>
+            </a:lvl6pPr>
+            <a:lvl7pPr marL="2743200" indent="0" algn="ctr" defTabSz="914400" rtl="0" eaLnBrk="1" latinLnBrk="0" hangingPunct="1">
+              <a:lnSpc>
+                <a:spcPct val="90000"/>
+              </a:lnSpc>
+              <a:spcBef>
+                <a:spcPts val="500"/>
+              </a:spcBef>
+              <a:buFont typeface="Arial" panose="020B0604020202020204" pitchFamily="34" charset="0"/>
+              <a:buNone/>
+              <a:defRPr sz="1600" kern="1200">
+                <a:solidFill>
+                  <a:schemeClr val="tx1"/>
+                </a:solidFill>
+                <a:latin typeface="+mn-lt"/>
+                <a:ea typeface="+mn-ea"/>
+                <a:cs typeface="+mn-cs"/>
+              </a:defRPr>
+            </a:lvl7pPr>
+            <a:lvl8pPr marL="3200400" indent="0" algn="ctr" defTabSz="914400" rtl="0" eaLnBrk="1" latinLnBrk="0" hangingPunct="1">
+              <a:lnSpc>
+                <a:spcPct val="90000"/>
+              </a:lnSpc>
+              <a:spcBef>
+                <a:spcPts val="500"/>
+              </a:spcBef>
+              <a:buFont typeface="Arial" panose="020B0604020202020204" pitchFamily="34" charset="0"/>
+              <a:buNone/>
+              <a:defRPr sz="1600" kern="1200">
+                <a:solidFill>
+                  <a:schemeClr val="tx1"/>
+                </a:solidFill>
+                <a:latin typeface="+mn-lt"/>
+                <a:ea typeface="+mn-ea"/>
+                <a:cs typeface="+mn-cs"/>
+              </a:defRPr>
+            </a:lvl8pPr>
+            <a:lvl9pPr marL="3657600" indent="0" algn="ctr" defTabSz="914400" rtl="0" eaLnBrk="1" latinLnBrk="0" hangingPunct="1">
+              <a:lnSpc>
+                <a:spcPct val="90000"/>
+              </a:lnSpc>
+              <a:spcBef>
+                <a:spcPts val="500"/>
+              </a:spcBef>
+              <a:buFont typeface="Arial" panose="020B0604020202020204" pitchFamily="34" charset="0"/>
+              <a:buNone/>
+              <a:defRPr sz="1600" kern="1200">
+                <a:solidFill>
+                  <a:schemeClr val="tx1"/>
+                </a:solidFill>
+                <a:latin typeface="+mn-lt"/>
+                <a:ea typeface="+mn-ea"/>
+                <a:cs typeface="+mn-cs"/>
+              </a:defRPr>
+            </a:lvl9pPr>
+          </a:lstStyle>
+          <a:p>
+            <a:pPr algn="l"/>
+            <a:r>
+              <a:rPr lang="en-US" dirty="0"/>
+              <a:t>Artwork</a:t>
+            </a:r>
+          </a:p>
+        </p:txBody>
+      </p:sp>
+      <p:sp>
+        <p:nvSpPr>
+          <p:cNvPr id="8" name="Subtitle 2">
+            <a:extLst>
+              <a:ext uri="{FF2B5EF4-FFF2-40B4-BE49-F238E27FC236}">
+                <a16:creationId xmlns:a16="http://schemas.microsoft.com/office/drawing/2014/main" id="{D8312918-CFC7-B432-D041-0B412DED334C}"/>
+              </a:ext>
+            </a:extLst>
+          </p:cNvPr>
+          <p:cNvSpPr txBox="1">
+            <a:spLocks/>
+          </p:cNvSpPr>
+          <p:nvPr/>
+        </p:nvSpPr>
+        <p:spPr>
+          <a:xfrm>
+            <a:off x="6452616" y="3868610"/>
+            <a:ext cx="4733544" cy="420624"/>
+          </a:xfrm>
+          <a:prstGeom prst="rect">
+            <a:avLst/>
+          </a:prstGeom>
+        </p:spPr>
+        <p:txBody>
+          <a:bodyPr vert="horz" lIns="91440" tIns="45720" rIns="91440" bIns="45720" rtlCol="0">
+            <a:normAutofit lnSpcReduction="10000"/>
+          </a:bodyPr>
+          <a:lstStyle>
+            <a:lvl1pPr marL="0" indent="0" algn="ctr" defTabSz="914400" rtl="0" eaLnBrk="1" latinLnBrk="0" hangingPunct="1">
+              <a:lnSpc>
+                <a:spcPct val="90000"/>
+              </a:lnSpc>
+              <a:spcBef>
+                <a:spcPts val="1000"/>
+              </a:spcBef>
+              <a:buFont typeface="Arial" panose="020B0604020202020204" pitchFamily="34" charset="0"/>
+              <a:buNone/>
+              <a:defRPr sz="2400" kern="1200">
+                <a:solidFill>
+                  <a:schemeClr val="tx1"/>
+                </a:solidFill>
+                <a:latin typeface="+mn-lt"/>
+                <a:ea typeface="+mn-ea"/>
+                <a:cs typeface="+mn-cs"/>
+              </a:defRPr>
+            </a:lvl1pPr>
+            <a:lvl2pPr marL="457200" indent="0" algn="ctr" defTabSz="914400" rtl="0" eaLnBrk="1" latinLnBrk="0" hangingPunct="1">
+              <a:lnSpc>
+                <a:spcPct val="90000"/>
+              </a:lnSpc>
+              <a:spcBef>
+                <a:spcPts val="500"/>
+              </a:spcBef>
+              <a:buFont typeface="Arial" panose="020B0604020202020204" pitchFamily="34" charset="0"/>
+              <a:buNone/>
+              <a:defRPr sz="2000" kern="1200">
+                <a:solidFill>
+                  <a:schemeClr val="tx1"/>
+                </a:solidFill>
+                <a:latin typeface="+mn-lt"/>
+                <a:ea typeface="+mn-ea"/>
+                <a:cs typeface="+mn-cs"/>
+              </a:defRPr>
+            </a:lvl2pPr>
+            <a:lvl3pPr marL="914400" indent="0" algn="ctr" defTabSz="914400" rtl="0" eaLnBrk="1" latinLnBrk="0" hangingPunct="1">
+              <a:lnSpc>
+                <a:spcPct val="90000"/>
+              </a:lnSpc>
+              <a:spcBef>
+                <a:spcPts val="500"/>
+              </a:spcBef>
+              <a:buFont typeface="Arial" panose="020B0604020202020204" pitchFamily="34" charset="0"/>
+              <a:buNone/>
+              <a:defRPr sz="1800" kern="1200">
+                <a:solidFill>
+                  <a:schemeClr val="tx1"/>
+                </a:solidFill>
+                <a:latin typeface="+mn-lt"/>
+                <a:ea typeface="+mn-ea"/>
+                <a:cs typeface="+mn-cs"/>
+              </a:defRPr>
+            </a:lvl3pPr>
+            <a:lvl4pPr marL="1371600" indent="0" algn="ctr" defTabSz="914400" rtl="0" eaLnBrk="1" latinLnBrk="0" hangingPunct="1">
+              <a:lnSpc>
+                <a:spcPct val="90000"/>
+              </a:lnSpc>
+              <a:spcBef>
+                <a:spcPts val="500"/>
+              </a:spcBef>
+              <a:buFont typeface="Arial" panose="020B0604020202020204" pitchFamily="34" charset="0"/>
+              <a:buNone/>
+              <a:defRPr sz="1600" kern="1200">
+                <a:solidFill>
+                  <a:schemeClr val="tx1"/>
+                </a:solidFill>
+                <a:latin typeface="+mn-lt"/>
+                <a:ea typeface="+mn-ea"/>
+                <a:cs typeface="+mn-cs"/>
+              </a:defRPr>
+            </a:lvl4pPr>
+            <a:lvl5pPr marL="1828800" indent="0" algn="ctr" defTabSz="914400" rtl="0" eaLnBrk="1" latinLnBrk="0" hangingPunct="1">
+              <a:lnSpc>
+                <a:spcPct val="90000"/>
+              </a:lnSpc>
+              <a:spcBef>
+                <a:spcPts val="500"/>
+              </a:spcBef>
+              <a:buFont typeface="Arial" panose="020B0604020202020204" pitchFamily="34" charset="0"/>
+              <a:buNone/>
+              <a:defRPr sz="1600" kern="1200">
+                <a:solidFill>
+                  <a:schemeClr val="tx1"/>
+                </a:solidFill>
+                <a:latin typeface="+mn-lt"/>
+                <a:ea typeface="+mn-ea"/>
+                <a:cs typeface="+mn-cs"/>
+              </a:defRPr>
+            </a:lvl5pPr>
+            <a:lvl6pPr marL="2286000" indent="0" algn="ctr" defTabSz="914400" rtl="0" eaLnBrk="1" latinLnBrk="0" hangingPunct="1">
+              <a:lnSpc>
+                <a:spcPct val="90000"/>
+              </a:lnSpc>
+              <a:spcBef>
+                <a:spcPts val="500"/>
+              </a:spcBef>
+              <a:buFont typeface="Arial" panose="020B0604020202020204" pitchFamily="34" charset="0"/>
+              <a:buNone/>
+              <a:defRPr sz="1600" kern="1200">
+                <a:solidFill>
+                  <a:schemeClr val="tx1"/>
+                </a:solidFill>
+                <a:latin typeface="+mn-lt"/>
+                <a:ea typeface="+mn-ea"/>
+                <a:cs typeface="+mn-cs"/>
+              </a:defRPr>
+            </a:lvl6pPr>
+            <a:lvl7pPr marL="2743200" indent="0" algn="ctr" defTabSz="914400" rtl="0" eaLnBrk="1" latinLnBrk="0" hangingPunct="1">
+              <a:lnSpc>
+                <a:spcPct val="90000"/>
+              </a:lnSpc>
+              <a:spcBef>
+                <a:spcPts val="500"/>
+              </a:spcBef>
+              <a:buFont typeface="Arial" panose="020B0604020202020204" pitchFamily="34" charset="0"/>
+              <a:buNone/>
+              <a:defRPr sz="1600" kern="1200">
+                <a:solidFill>
+                  <a:schemeClr val="tx1"/>
+                </a:solidFill>
+                <a:latin typeface="+mn-lt"/>
+                <a:ea typeface="+mn-ea"/>
+                <a:cs typeface="+mn-cs"/>
+              </a:defRPr>
+            </a:lvl7pPr>
+            <a:lvl8pPr marL="3200400" indent="0" algn="ctr" defTabSz="914400" rtl="0" eaLnBrk="1" latinLnBrk="0" hangingPunct="1">
+              <a:lnSpc>
+                <a:spcPct val="90000"/>
+              </a:lnSpc>
+              <a:spcBef>
+                <a:spcPts val="500"/>
+              </a:spcBef>
+              <a:buFont typeface="Arial" panose="020B0604020202020204" pitchFamily="34" charset="0"/>
+              <a:buNone/>
+              <a:defRPr sz="1600" kern="1200">
+                <a:solidFill>
+                  <a:schemeClr val="tx1"/>
+                </a:solidFill>
+                <a:latin typeface="+mn-lt"/>
+                <a:ea typeface="+mn-ea"/>
+                <a:cs typeface="+mn-cs"/>
+              </a:defRPr>
+            </a:lvl8pPr>
+            <a:lvl9pPr marL="3657600" indent="0" algn="ctr" defTabSz="914400" rtl="0" eaLnBrk="1" latinLnBrk="0" hangingPunct="1">
+              <a:lnSpc>
+                <a:spcPct val="90000"/>
+              </a:lnSpc>
+              <a:spcBef>
+                <a:spcPts val="500"/>
+              </a:spcBef>
+              <a:buFont typeface="Arial" panose="020B0604020202020204" pitchFamily="34" charset="0"/>
+              <a:buNone/>
+              <a:defRPr sz="1600" kern="1200">
+                <a:solidFill>
+                  <a:schemeClr val="tx1"/>
+                </a:solidFill>
+                <a:latin typeface="+mn-lt"/>
+                <a:ea typeface="+mn-ea"/>
+                <a:cs typeface="+mn-cs"/>
+              </a:defRPr>
+            </a:lvl9pPr>
+          </a:lstStyle>
+          <a:p>
+            <a:pPr algn="l"/>
+            <a:r>
+              <a:rPr lang="en-US" dirty="0"/>
+              <a:t>Narrative</a:t>
+            </a:r>
+          </a:p>
+        </p:txBody>
+      </p:sp>
+      <p:sp>
+        <p:nvSpPr>
+          <p:cNvPr id="9" name="Subtitle 2">
+            <a:extLst>
+              <a:ext uri="{FF2B5EF4-FFF2-40B4-BE49-F238E27FC236}">
+                <a16:creationId xmlns:a16="http://schemas.microsoft.com/office/drawing/2014/main" id="{B524499D-9BBA-B82F-6A2E-A79011B85745}"/>
+              </a:ext>
+            </a:extLst>
+          </p:cNvPr>
+          <p:cNvSpPr txBox="1">
+            <a:spLocks/>
+          </p:cNvSpPr>
+          <p:nvPr/>
+        </p:nvSpPr>
+        <p:spPr>
+          <a:xfrm>
+            <a:off x="6452616" y="4289234"/>
+            <a:ext cx="4733544" cy="2203704"/>
+          </a:xfrm>
+          <a:prstGeom prst="rect">
+            <a:avLst/>
+          </a:prstGeom>
+        </p:spPr>
+        <p:txBody>
+          <a:bodyPr vert="horz" lIns="91440" tIns="45720" rIns="91440" bIns="45720" rtlCol="0">
+            <a:normAutofit/>
+          </a:bodyPr>
+          <a:lstStyle>
+            <a:lvl1pPr marL="0" indent="0" algn="ctr" defTabSz="914400" rtl="0" eaLnBrk="1" latinLnBrk="0" hangingPunct="1">
+              <a:lnSpc>
+                <a:spcPct val="90000"/>
+              </a:lnSpc>
+              <a:spcBef>
+                <a:spcPts val="1000"/>
+              </a:spcBef>
+              <a:buFont typeface="Arial" panose="020B0604020202020204" pitchFamily="34" charset="0"/>
+              <a:buNone/>
+              <a:defRPr sz="2400" kern="1200">
+                <a:solidFill>
+                  <a:schemeClr val="tx1"/>
+                </a:solidFill>
+                <a:latin typeface="+mn-lt"/>
+                <a:ea typeface="+mn-ea"/>
+                <a:cs typeface="+mn-cs"/>
+              </a:defRPr>
+            </a:lvl1pPr>
+            <a:lvl2pPr marL="457200" indent="0" algn="ctr" defTabSz="914400" rtl="0" eaLnBrk="1" latinLnBrk="0" hangingPunct="1">
+              <a:lnSpc>
+                <a:spcPct val="90000"/>
+              </a:lnSpc>
+              <a:spcBef>
+                <a:spcPts val="500"/>
+              </a:spcBef>
+              <a:buFont typeface="Arial" panose="020B0604020202020204" pitchFamily="34" charset="0"/>
+              <a:buNone/>
+              <a:defRPr sz="2000" kern="1200">
+                <a:solidFill>
+                  <a:schemeClr val="tx1"/>
+                </a:solidFill>
+                <a:latin typeface="+mn-lt"/>
+                <a:ea typeface="+mn-ea"/>
+                <a:cs typeface="+mn-cs"/>
+              </a:defRPr>
+            </a:lvl2pPr>
+            <a:lvl3pPr marL="914400" indent="0" algn="ctr" defTabSz="914400" rtl="0" eaLnBrk="1" latinLnBrk="0" hangingPunct="1">
+              <a:lnSpc>
+                <a:spcPct val="90000"/>
+              </a:lnSpc>
+              <a:spcBef>
+                <a:spcPts val="500"/>
+              </a:spcBef>
+              <a:buFont typeface="Arial" panose="020B0604020202020204" pitchFamily="34" charset="0"/>
+              <a:buNone/>
+              <a:defRPr sz="1800" kern="1200">
+                <a:solidFill>
+                  <a:schemeClr val="tx1"/>
+                </a:solidFill>
+                <a:latin typeface="+mn-lt"/>
+                <a:ea typeface="+mn-ea"/>
+                <a:cs typeface="+mn-cs"/>
+              </a:defRPr>
+            </a:lvl3pPr>
+            <a:lvl4pPr marL="1371600" indent="0" algn="ctr" defTabSz="914400" rtl="0" eaLnBrk="1" latinLnBrk="0" hangingPunct="1">
+              <a:lnSpc>
+                <a:spcPct val="90000"/>
+              </a:lnSpc>
+              <a:spcBef>
+                <a:spcPts val="500"/>
+              </a:spcBef>
+              <a:buFont typeface="Arial" panose="020B0604020202020204" pitchFamily="34" charset="0"/>
+              <a:buNone/>
+              <a:defRPr sz="1600" kern="1200">
+                <a:solidFill>
+                  <a:schemeClr val="tx1"/>
+                </a:solidFill>
+                <a:latin typeface="+mn-lt"/>
+                <a:ea typeface="+mn-ea"/>
+                <a:cs typeface="+mn-cs"/>
+              </a:defRPr>
+            </a:lvl4pPr>
+            <a:lvl5pPr marL="1828800" indent="0" algn="ctr" defTabSz="914400" rtl="0" eaLnBrk="1" latinLnBrk="0" hangingPunct="1">
+              <a:lnSpc>
+                <a:spcPct val="90000"/>
+              </a:lnSpc>
+              <a:spcBef>
+                <a:spcPts val="500"/>
+              </a:spcBef>
+              <a:buFont typeface="Arial" panose="020B0604020202020204" pitchFamily="34" charset="0"/>
+              <a:buNone/>
+              <a:defRPr sz="1600" kern="1200">
+                <a:solidFill>
+                  <a:schemeClr val="tx1"/>
+                </a:solidFill>
+                <a:latin typeface="+mn-lt"/>
+                <a:ea typeface="+mn-ea"/>
+                <a:cs typeface="+mn-cs"/>
+              </a:defRPr>
+            </a:lvl5pPr>
+            <a:lvl6pPr marL="2286000" indent="0" algn="ctr" defTabSz="914400" rtl="0" eaLnBrk="1" latinLnBrk="0" hangingPunct="1">
+              <a:lnSpc>
+                <a:spcPct val="90000"/>
+              </a:lnSpc>
+              <a:spcBef>
+                <a:spcPts val="500"/>
+              </a:spcBef>
+              <a:buFont typeface="Arial" panose="020B0604020202020204" pitchFamily="34" charset="0"/>
+              <a:buNone/>
+              <a:defRPr sz="1600" kern="1200">
+                <a:solidFill>
+                  <a:schemeClr val="tx1"/>
+                </a:solidFill>
+                <a:latin typeface="+mn-lt"/>
+                <a:ea typeface="+mn-ea"/>
+                <a:cs typeface="+mn-cs"/>
+              </a:defRPr>
+            </a:lvl6pPr>
+            <a:lvl7pPr marL="2743200" indent="0" algn="ctr" defTabSz="914400" rtl="0" eaLnBrk="1" latinLnBrk="0" hangingPunct="1">
+              <a:lnSpc>
+                <a:spcPct val="90000"/>
+              </a:lnSpc>
+              <a:spcBef>
+                <a:spcPts val="500"/>
+              </a:spcBef>
+              <a:buFont typeface="Arial" panose="020B0604020202020204" pitchFamily="34" charset="0"/>
+              <a:buNone/>
+              <a:defRPr sz="1600" kern="1200">
+                <a:solidFill>
+                  <a:schemeClr val="tx1"/>
+                </a:solidFill>
+                <a:latin typeface="+mn-lt"/>
+                <a:ea typeface="+mn-ea"/>
+                <a:cs typeface="+mn-cs"/>
+              </a:defRPr>
+            </a:lvl7pPr>
+            <a:lvl8pPr marL="3200400" indent="0" algn="ctr" defTabSz="914400" rtl="0" eaLnBrk="1" latinLnBrk="0" hangingPunct="1">
+              <a:lnSpc>
+                <a:spcPct val="90000"/>
+              </a:lnSpc>
+              <a:spcBef>
+                <a:spcPts val="500"/>
+              </a:spcBef>
+              <a:buFont typeface="Arial" panose="020B0604020202020204" pitchFamily="34" charset="0"/>
+              <a:buNone/>
+              <a:defRPr sz="1600" kern="1200">
+                <a:solidFill>
+                  <a:schemeClr val="tx1"/>
+                </a:solidFill>
+                <a:latin typeface="+mn-lt"/>
+                <a:ea typeface="+mn-ea"/>
+                <a:cs typeface="+mn-cs"/>
+              </a:defRPr>
+            </a:lvl8pPr>
+            <a:lvl9pPr marL="3657600" indent="0" algn="ctr" defTabSz="914400" rtl="0" eaLnBrk="1" latinLnBrk="0" hangingPunct="1">
+              <a:lnSpc>
+                <a:spcPct val="90000"/>
+              </a:lnSpc>
+              <a:spcBef>
+                <a:spcPts val="500"/>
+              </a:spcBef>
+              <a:buFont typeface="Arial" panose="020B0604020202020204" pitchFamily="34" charset="0"/>
+              <a:buNone/>
+              <a:defRPr sz="1600" kern="1200">
+                <a:solidFill>
+                  <a:schemeClr val="tx1"/>
+                </a:solidFill>
+                <a:latin typeface="+mn-lt"/>
+                <a:ea typeface="+mn-ea"/>
+                <a:cs typeface="+mn-cs"/>
+              </a:defRPr>
+            </a:lvl9pPr>
+          </a:lstStyle>
+          <a:p>
+            <a:pPr algn="l"/>
+            <a:r>
+              <a:rPr lang="en-CA" sz="2000" dirty="0"/>
+              <a:t>Writing for Streaming/Partner/Collabs (During the whole development)</a:t>
+            </a:r>
+          </a:p>
+          <a:p>
+            <a:pPr algn="l"/>
+            <a:r>
+              <a:rPr lang="en-CA" sz="2000" dirty="0"/>
+              <a:t>Narrative to Game (During the whole development)</a:t>
+            </a:r>
+          </a:p>
+          <a:p>
+            <a:pPr algn="l"/>
+            <a:endParaRPr lang="en-CA" sz="2000" dirty="0"/>
           </a:p>
         </p:txBody>
       </p:sp>
@@ -3772,6 +4600,14 @@
 <file path=ppt/slides/slide6.xml><?xml version="1.0" encoding="utf-8"?>
 <p:sld xmlns:a="http://schemas.openxmlformats.org/drawingml/2006/main" xmlns:r="http://schemas.openxmlformats.org/officeDocument/2006/relationships" xmlns:p="http://schemas.openxmlformats.org/presentationml/2006/main">
   <p:cSld>
+    <p:bg>
+      <p:bgPr>
+        <a:solidFill>
+          <a:schemeClr val="bg1"/>
+        </a:solidFill>
+        <a:effectLst/>
+      </p:bgPr>
+    </p:bg>
     <p:spTree>
       <p:nvGrpSpPr>
         <p:cNvPr id="1" name="">
@@ -3810,46 +4646,61 @@
         </p:nvSpPr>
         <p:spPr>
           <a:xfrm>
-            <a:off x="1524000" y="155448"/>
-            <a:ext cx="9144000" cy="960120"/>
+            <a:off x="1028700" y="1967266"/>
+            <a:ext cx="2628900" cy="2547257"/>
           </a:xfrm>
+          <a:noFill/>
         </p:spPr>
         <p:txBody>
-          <a:bodyPr/>
-          <a:lstStyle/>
-          <a:p>
-            <a:r>
-              <a:rPr lang="en-US" dirty="0"/>
+          <a:bodyPr vert="horz" lIns="91440" tIns="45720" rIns="91440" bIns="45720" rtlCol="0" anchor="ctr">
+            <a:normAutofit/>
+          </a:bodyPr>
+          <a:lstStyle/>
+          <a:p>
+            <a:r>
+              <a:rPr lang="en-US" sz="3600" kern="1200">
+                <a:solidFill>
+                  <a:srgbClr val="FFFFFF"/>
+                </a:solidFill>
+                <a:latin typeface="+mj-lt"/>
+                <a:ea typeface="+mj-ea"/>
+                <a:cs typeface="+mj-cs"/>
+              </a:rPr>
               <a:t>Ownership</a:t>
             </a:r>
           </a:p>
         </p:txBody>
       </p:sp>
-      <p:sp>
-        <p:nvSpPr>
-          <p:cNvPr id="3" name="Subtitle 2">
+      <p:pic>
+        <p:nvPicPr>
+          <p:cNvPr id="5" name="Picture 4">
             <a:extLst>
               <a:ext uri="{FF2B5EF4-FFF2-40B4-BE49-F238E27FC236}">
-                <a16:creationId xmlns:a16="http://schemas.microsoft.com/office/drawing/2014/main" id="{05BFD71B-98ED-40D3-A935-1D6DB8938B22}"/>
+                <a16:creationId xmlns:a16="http://schemas.microsoft.com/office/drawing/2014/main" id="{557AD6D1-FC23-D7F8-93E9-A9EF92766DC6}"/>
               </a:ext>
             </a:extLst>
           </p:cNvPr>
-          <p:cNvSpPr>
-            <a:spLocks noGrp="1"/>
-          </p:cNvSpPr>
-          <p:nvPr>
-            <p:ph type="subTitle" idx="1"/>
-          </p:nvPr>
-        </p:nvSpPr>
-        <p:spPr/>
-        <p:txBody>
-          <a:bodyPr/>
-          <a:lstStyle/>
-          <a:p>
-            <a:endParaRPr lang="en-US" dirty="0"/>
-          </a:p>
-        </p:txBody>
-      </p:sp>
+          <p:cNvPicPr>
+            <a:picLocks noChangeAspect="1"/>
+          </p:cNvPicPr>
+          <p:nvPr/>
+        </p:nvPicPr>
+        <p:blipFill>
+          <a:blip r:embed="rId2"/>
+          <a:stretch>
+            <a:fillRect/>
+          </a:stretch>
+        </p:blipFill>
+        <p:spPr>
+          <a:xfrm>
+            <a:off x="4777316" y="1147825"/>
+            <a:ext cx="6780700" cy="4560021"/>
+          </a:xfrm>
+          <a:prstGeom prst="rect">
+            <a:avLst/>
+          </a:prstGeom>
+        </p:spPr>
+      </p:pic>
     </p:spTree>
     <p:extLst>
       <p:ext uri="{BB962C8B-B14F-4D97-AF65-F5344CB8AC3E}">
@@ -3866,6 +4717,14 @@
 <file path=ppt/slides/slide7.xml><?xml version="1.0" encoding="utf-8"?>
 <p:sld xmlns:a="http://schemas.openxmlformats.org/drawingml/2006/main" xmlns:r="http://schemas.openxmlformats.org/officeDocument/2006/relationships" xmlns:p="http://schemas.openxmlformats.org/presentationml/2006/main">
   <p:cSld>
+    <p:bg>
+      <p:bgPr>
+        <a:solidFill>
+          <a:schemeClr val="bg1"/>
+        </a:solidFill>
+        <a:effectLst/>
+      </p:bgPr>
+    </p:bg>
     <p:spTree>
       <p:nvGrpSpPr>
         <p:cNvPr id="1" name="">
@@ -3886,6 +4745,628 @@
           <a:chExt cx="0" cy="0"/>
         </a:xfrm>
       </p:grpSpPr>
+      <p:sp useBgFill="1">
+        <p:nvSpPr>
+          <p:cNvPr id="8" name="Rectangle 7">
+            <a:extLst>
+              <a:ext uri="{FF2B5EF4-FFF2-40B4-BE49-F238E27FC236}">
+                <a16:creationId xmlns:a16="http://schemas.microsoft.com/office/drawing/2014/main" id="{09588DA8-065E-4F6F-8EFD-43104AB2E0CF}"/>
+              </a:ext>
+              <a:ext uri="{C183D7F6-B498-43B3-948B-1728B52AA6E4}">
+                <adec:decorative xmlns:adec="http://schemas.microsoft.com/office/drawing/2017/decorative" val="1"/>
+              </a:ext>
+            </a:extLst>
+          </p:cNvPr>
+          <p:cNvSpPr>
+            <a:spLocks noGrp="1" noRot="1" noChangeAspect="1" noMove="1" noResize="1" noEditPoints="1" noAdjustHandles="1" noChangeArrowheads="1" noChangeShapeType="1" noTextEdit="1"/>
+          </p:cNvSpPr>
+          <p:nvPr>
+            <p:extLst>
+              <p:ext uri="{386F3935-93C4-4BCD-93E2-E3B085C9AB24}">
+                <p16:designElem xmlns:p16="http://schemas.microsoft.com/office/powerpoint/2015/main" val="1"/>
+              </p:ext>
+            </p:extLst>
+          </p:nvPr>
+        </p:nvSpPr>
+        <p:spPr>
+          <a:xfrm>
+            <a:off x="0" y="0"/>
+            <a:ext cx="12192000" cy="6858000"/>
+          </a:xfrm>
+          <a:prstGeom prst="rect">
+            <a:avLst/>
+          </a:prstGeom>
+          <a:ln w="12700" cap="flat" cmpd="sng" algn="ctr">
+            <a:noFill/>
+            <a:prstDash val="solid"/>
+            <a:miter lim="800000"/>
+          </a:ln>
+          <a:effectLst/>
+          <a:extLst>
+            <a:ext uri="{91240B29-F687-4F45-9708-019B960494DF}">
+              <a14:hiddenLine xmlns:a14="http://schemas.microsoft.com/office/drawing/2010/main" w="12700" cap="flat" cmpd="sng" algn="ctr">
+                <a:solidFill>
+                  <a:schemeClr val="accent1">
+                    <a:shade val="50000"/>
+                  </a:schemeClr>
+                </a:solidFill>
+                <a:prstDash val="solid"/>
+                <a:miter lim="800000"/>
+              </a14:hiddenLine>
+            </a:ext>
+          </a:extLst>
+        </p:spPr>
+        <p:style>
+          <a:lnRef idx="2">
+            <a:schemeClr val="accent1">
+              <a:shade val="50000"/>
+            </a:schemeClr>
+          </a:lnRef>
+          <a:fillRef idx="1">
+            <a:schemeClr val="accent1"/>
+          </a:fillRef>
+          <a:effectRef idx="0">
+            <a:schemeClr val="accent1"/>
+          </a:effectRef>
+          <a:fontRef idx="minor">
+            <a:schemeClr val="lt1"/>
+          </a:fontRef>
+        </p:style>
+        <p:txBody>
+          <a:bodyPr rtlCol="0" anchor="ctr"/>
+          <a:lstStyle/>
+          <a:p>
+            <a:pPr algn="ctr"/>
+            <a:endParaRPr lang="en-US"/>
+          </a:p>
+        </p:txBody>
+      </p:sp>
+      <p:sp useBgFill="1">
+        <p:nvSpPr>
+          <p:cNvPr id="10" name="Rectangle 9">
+            <a:extLst>
+              <a:ext uri="{FF2B5EF4-FFF2-40B4-BE49-F238E27FC236}">
+                <a16:creationId xmlns:a16="http://schemas.microsoft.com/office/drawing/2014/main" id="{C4285719-470E-454C-AF62-8323075F1F5B}"/>
+              </a:ext>
+              <a:ext uri="{C183D7F6-B498-43B3-948B-1728B52AA6E4}">
+                <adec:decorative xmlns:adec="http://schemas.microsoft.com/office/drawing/2017/decorative" val="1"/>
+              </a:ext>
+            </a:extLst>
+          </p:cNvPr>
+          <p:cNvSpPr>
+            <a:spLocks noGrp="1" noRot="1" noChangeAspect="1" noMove="1" noResize="1" noEditPoints="1" noAdjustHandles="1" noChangeArrowheads="1" noChangeShapeType="1" noTextEdit="1"/>
+          </p:cNvSpPr>
+          <p:nvPr>
+            <p:extLst>
+              <p:ext uri="{386F3935-93C4-4BCD-93E2-E3B085C9AB24}">
+                <p16:designElem xmlns:p16="http://schemas.microsoft.com/office/powerpoint/2015/main" val="1"/>
+              </p:ext>
+            </p:extLst>
+          </p:nvPr>
+        </p:nvSpPr>
+        <p:spPr>
+          <a:xfrm>
+            <a:off x="0" y="0"/>
+            <a:ext cx="12188952" cy="6858000"/>
+          </a:xfrm>
+          <a:prstGeom prst="rect">
+            <a:avLst/>
+          </a:prstGeom>
+          <a:ln w="12700" cap="flat" cmpd="sng" algn="ctr">
+            <a:noFill/>
+            <a:prstDash val="solid"/>
+            <a:miter lim="800000"/>
+          </a:ln>
+          <a:effectLst/>
+          <a:extLst>
+            <a:ext uri="{91240B29-F687-4F45-9708-019B960494DF}">
+              <a14:hiddenLine xmlns:a14="http://schemas.microsoft.com/office/drawing/2010/main" w="12700" cap="flat" cmpd="sng" algn="ctr">
+                <a:solidFill>
+                  <a:schemeClr val="accent1">
+                    <a:shade val="50000"/>
+                  </a:schemeClr>
+                </a:solidFill>
+                <a:prstDash val="solid"/>
+                <a:miter lim="800000"/>
+              </a14:hiddenLine>
+            </a:ext>
+          </a:extLst>
+        </p:spPr>
+        <p:style>
+          <a:lnRef idx="2">
+            <a:schemeClr val="accent1">
+              <a:shade val="50000"/>
+            </a:schemeClr>
+          </a:lnRef>
+          <a:fillRef idx="1">
+            <a:schemeClr val="accent1"/>
+          </a:fillRef>
+          <a:effectRef idx="0">
+            <a:schemeClr val="accent1"/>
+          </a:effectRef>
+          <a:fontRef idx="minor">
+            <a:schemeClr val="lt1"/>
+          </a:fontRef>
+        </p:style>
+        <p:txBody>
+          <a:bodyPr rtlCol="0" anchor="ctr"/>
+          <a:lstStyle/>
+          <a:p>
+            <a:pPr algn="ctr"/>
+            <a:endParaRPr lang="en-US"/>
+          </a:p>
+        </p:txBody>
+      </p:sp>
+      <p:sp>
+        <p:nvSpPr>
+          <p:cNvPr id="12" name="Rectangle 11">
+            <a:extLst>
+              <a:ext uri="{FF2B5EF4-FFF2-40B4-BE49-F238E27FC236}">
+                <a16:creationId xmlns:a16="http://schemas.microsoft.com/office/drawing/2014/main" id="{CD9FE4EF-C4D8-49A0-B2FF-81D8DB7D8A24}"/>
+              </a:ext>
+              <a:ext uri="{C183D7F6-B498-43B3-948B-1728B52AA6E4}">
+                <adec:decorative xmlns:adec="http://schemas.microsoft.com/office/drawing/2017/decorative" val="1"/>
+              </a:ext>
+            </a:extLst>
+          </p:cNvPr>
+          <p:cNvSpPr>
+            <a:spLocks noGrp="1" noRot="1" noChangeAspect="1" noMove="1" noResize="1" noEditPoints="1" noAdjustHandles="1" noChangeArrowheads="1" noChangeShapeType="1" noTextEdit="1"/>
+          </p:cNvSpPr>
+          <p:nvPr>
+            <p:extLst>
+              <p:ext uri="{386F3935-93C4-4BCD-93E2-E3B085C9AB24}">
+                <p16:designElem xmlns:p16="http://schemas.microsoft.com/office/powerpoint/2015/main" val="1"/>
+              </p:ext>
+            </p:extLst>
+          </p:nvPr>
+        </p:nvSpPr>
+        <p:spPr>
+          <a:xfrm rot="5400000" flipH="1">
+            <a:off x="-1410084" y="1410082"/>
+            <a:ext cx="6858000" cy="4037836"/>
+          </a:xfrm>
+          <a:prstGeom prst="rect">
+            <a:avLst/>
+          </a:prstGeom>
+          <a:gradFill>
+            <a:gsLst>
+              <a:gs pos="8000">
+                <a:srgbClr val="000000"/>
+              </a:gs>
+              <a:gs pos="100000">
+                <a:schemeClr val="accent1">
+                  <a:lumMod val="75000"/>
+                </a:schemeClr>
+              </a:gs>
+            </a:gsLst>
+            <a:lin ang="3000000" scaled="0"/>
+          </a:gradFill>
+          <a:ln>
+            <a:noFill/>
+          </a:ln>
+        </p:spPr>
+        <p:style>
+          <a:lnRef idx="2">
+            <a:schemeClr val="accent1">
+              <a:shade val="50000"/>
+            </a:schemeClr>
+          </a:lnRef>
+          <a:fillRef idx="1">
+            <a:schemeClr val="accent1"/>
+          </a:fillRef>
+          <a:effectRef idx="0">
+            <a:schemeClr val="accent1"/>
+          </a:effectRef>
+          <a:fontRef idx="minor">
+            <a:schemeClr val="lt1"/>
+          </a:fontRef>
+        </p:style>
+        <p:txBody>
+          <a:bodyPr rtlCol="0" anchor="ctr"/>
+          <a:lstStyle/>
+          <a:p>
+            <a:pPr algn="ctr"/>
+            <a:endParaRPr lang="en-US"/>
+          </a:p>
+        </p:txBody>
+      </p:sp>
+      <p:sp>
+        <p:nvSpPr>
+          <p:cNvPr id="14" name="Rectangle 13">
+            <a:extLst>
+              <a:ext uri="{FF2B5EF4-FFF2-40B4-BE49-F238E27FC236}">
+                <a16:creationId xmlns:a16="http://schemas.microsoft.com/office/drawing/2014/main" id="{4300840D-0A0B-4512-BACA-B439D5B9C57C}"/>
+              </a:ext>
+              <a:ext uri="{C183D7F6-B498-43B3-948B-1728B52AA6E4}">
+                <adec:decorative xmlns:adec="http://schemas.microsoft.com/office/drawing/2017/decorative" val="1"/>
+              </a:ext>
+            </a:extLst>
+          </p:cNvPr>
+          <p:cNvSpPr>
+            <a:spLocks noGrp="1" noRot="1" noChangeAspect="1" noMove="1" noResize="1" noEditPoints="1" noAdjustHandles="1" noChangeArrowheads="1" noChangeShapeType="1" noTextEdit="1"/>
+          </p:cNvSpPr>
+          <p:nvPr>
+            <p:extLst>
+              <p:ext uri="{386F3935-93C4-4BCD-93E2-E3B085C9AB24}">
+                <p16:designElem xmlns:p16="http://schemas.microsoft.com/office/powerpoint/2015/main" val="1"/>
+              </p:ext>
+            </p:extLst>
+          </p:nvPr>
+        </p:nvSpPr>
+        <p:spPr>
+          <a:xfrm rot="5400000" flipH="1">
+            <a:off x="-1410085" y="1420219"/>
+            <a:ext cx="6857999" cy="4037839"/>
+          </a:xfrm>
+          <a:prstGeom prst="rect">
+            <a:avLst/>
+          </a:prstGeom>
+          <a:gradFill>
+            <a:gsLst>
+              <a:gs pos="0">
+                <a:srgbClr val="000000">
+                  <a:alpha val="0"/>
+                </a:srgbClr>
+              </a:gs>
+              <a:gs pos="99000">
+                <a:schemeClr val="accent1">
+                  <a:alpha val="46000"/>
+                </a:schemeClr>
+              </a:gs>
+            </a:gsLst>
+            <a:lin ang="1800000" scaled="0"/>
+          </a:gradFill>
+          <a:ln>
+            <a:noFill/>
+          </a:ln>
+        </p:spPr>
+        <p:style>
+          <a:lnRef idx="2">
+            <a:schemeClr val="accent1">
+              <a:shade val="50000"/>
+            </a:schemeClr>
+          </a:lnRef>
+          <a:fillRef idx="1">
+            <a:schemeClr val="accent1"/>
+          </a:fillRef>
+          <a:effectRef idx="0">
+            <a:schemeClr val="accent1"/>
+          </a:effectRef>
+          <a:fontRef idx="minor">
+            <a:schemeClr val="lt1"/>
+          </a:fontRef>
+        </p:style>
+        <p:txBody>
+          <a:bodyPr rtlCol="0" anchor="ctr"/>
+          <a:lstStyle/>
+          <a:p>
+            <a:pPr algn="ctr"/>
+            <a:endParaRPr lang="en-US"/>
+          </a:p>
+        </p:txBody>
+      </p:sp>
+      <p:sp>
+        <p:nvSpPr>
+          <p:cNvPr id="16" name="Rectangle 15">
+            <a:extLst>
+              <a:ext uri="{FF2B5EF4-FFF2-40B4-BE49-F238E27FC236}">
+                <a16:creationId xmlns:a16="http://schemas.microsoft.com/office/drawing/2014/main" id="{D2B78728-A580-49A7-84F9-6EF6F583ADE0}"/>
+              </a:ext>
+              <a:ext uri="{C183D7F6-B498-43B3-948B-1728B52AA6E4}">
+                <adec:decorative xmlns:adec="http://schemas.microsoft.com/office/drawing/2017/decorative" val="1"/>
+              </a:ext>
+            </a:extLst>
+          </p:cNvPr>
+          <p:cNvSpPr>
+            <a:spLocks noGrp="1" noRot="1" noChangeAspect="1" noMove="1" noResize="1" noEditPoints="1" noAdjustHandles="1" noChangeArrowheads="1" noChangeShapeType="1" noTextEdit="1"/>
+          </p:cNvSpPr>
+          <p:nvPr>
+            <p:extLst>
+              <p:ext uri="{386F3935-93C4-4BCD-93E2-E3B085C9AB24}">
+                <p16:designElem xmlns:p16="http://schemas.microsoft.com/office/powerpoint/2015/main" val="1"/>
+              </p:ext>
+            </p:extLst>
+          </p:nvPr>
+        </p:nvSpPr>
+        <p:spPr>
+          <a:xfrm rot="5400000" flipH="1">
+            <a:off x="767923" y="3588085"/>
+            <a:ext cx="2501979" cy="4037841"/>
+          </a:xfrm>
+          <a:prstGeom prst="rect">
+            <a:avLst/>
+          </a:prstGeom>
+          <a:gradFill>
+            <a:gsLst>
+              <a:gs pos="2000">
+                <a:schemeClr val="accent1">
+                  <a:alpha val="29000"/>
+                </a:schemeClr>
+              </a:gs>
+              <a:gs pos="100000">
+                <a:srgbClr val="000000">
+                  <a:alpha val="30000"/>
+                </a:srgbClr>
+              </a:gs>
+            </a:gsLst>
+            <a:lin ang="7800000" scaled="0"/>
+          </a:gradFill>
+          <a:ln>
+            <a:noFill/>
+          </a:ln>
+        </p:spPr>
+        <p:style>
+          <a:lnRef idx="2">
+            <a:schemeClr val="accent1">
+              <a:shade val="50000"/>
+            </a:schemeClr>
+          </a:lnRef>
+          <a:fillRef idx="1">
+            <a:schemeClr val="accent1"/>
+          </a:fillRef>
+          <a:effectRef idx="0">
+            <a:schemeClr val="accent1"/>
+          </a:effectRef>
+          <a:fontRef idx="minor">
+            <a:schemeClr val="lt1"/>
+          </a:fontRef>
+        </p:style>
+        <p:txBody>
+          <a:bodyPr rtlCol="0" anchor="ctr"/>
+          <a:lstStyle/>
+          <a:p>
+            <a:pPr algn="ctr"/>
+            <a:endParaRPr lang="en-US" dirty="0"/>
+          </a:p>
+        </p:txBody>
+      </p:sp>
+      <p:sp>
+        <p:nvSpPr>
+          <p:cNvPr id="18" name="Freeform: Shape 17">
+            <a:extLst>
+              <a:ext uri="{FF2B5EF4-FFF2-40B4-BE49-F238E27FC236}">
+                <a16:creationId xmlns:a16="http://schemas.microsoft.com/office/drawing/2014/main" id="{38FAA1A1-D861-433F-88FA-1E9D6FD31D11}"/>
+              </a:ext>
+              <a:ext uri="{C183D7F6-B498-43B3-948B-1728B52AA6E4}">
+                <adec:decorative xmlns:adec="http://schemas.microsoft.com/office/drawing/2017/decorative" val="1"/>
+              </a:ext>
+            </a:extLst>
+          </p:cNvPr>
+          <p:cNvSpPr>
+            <a:spLocks noGrp="1" noRot="1" noChangeAspect="1" noMove="1" noResize="1" noEditPoints="1" noAdjustHandles="1" noChangeArrowheads="1" noChangeShapeType="1" noTextEdit="1"/>
+          </p:cNvSpPr>
+          <p:nvPr>
+            <p:extLst>
+              <p:ext uri="{386F3935-93C4-4BCD-93E2-E3B085C9AB24}">
+                <p16:designElem xmlns:p16="http://schemas.microsoft.com/office/powerpoint/2015/main" val="1"/>
+              </p:ext>
+            </p:extLst>
+          </p:nvPr>
+        </p:nvSpPr>
+        <p:spPr>
+          <a:xfrm rot="20635413">
+            <a:off x="-501737" y="969718"/>
+            <a:ext cx="3900357" cy="4178958"/>
+          </a:xfrm>
+          <a:custGeom>
+            <a:avLst/>
+            <a:gdLst>
+              <a:gd name="connsiteX0" fmla="*/ 2432225 w 3900357"/>
+              <a:gd name="connsiteY0" fmla="*/ 93939 h 4178958"/>
+              <a:gd name="connsiteX1" fmla="*/ 3900357 w 3900357"/>
+              <a:gd name="connsiteY1" fmla="*/ 2089479 h 4178958"/>
+              <a:gd name="connsiteX2" fmla="*/ 1810878 w 3900357"/>
+              <a:gd name="connsiteY2" fmla="*/ 4178958 h 4178958"/>
+              <a:gd name="connsiteX3" fmla="*/ 78249 w 3900357"/>
+              <a:gd name="connsiteY3" fmla="*/ 3257727 h 4178958"/>
+              <a:gd name="connsiteX4" fmla="*/ 0 w 3900357"/>
+              <a:gd name="connsiteY4" fmla="*/ 3128923 h 4178958"/>
+              <a:gd name="connsiteX5" fmla="*/ 831324 w 3900357"/>
+              <a:gd name="connsiteY5" fmla="*/ 244281 h 4178958"/>
+              <a:gd name="connsiteX6" fmla="*/ 997559 w 3900357"/>
+              <a:gd name="connsiteY6" fmla="*/ 164202 h 4178958"/>
+              <a:gd name="connsiteX7" fmla="*/ 1810878 w 3900357"/>
+              <a:gd name="connsiteY7" fmla="*/ 0 h 4178958"/>
+              <a:gd name="connsiteX8" fmla="*/ 2432225 w 3900357"/>
+              <a:gd name="connsiteY8" fmla="*/ 93939 h 4178958"/>
+            </a:gdLst>
+            <a:ahLst/>
+            <a:cxnLst>
+              <a:cxn ang="0">
+                <a:pos x="connsiteX0" y="connsiteY0"/>
+              </a:cxn>
+              <a:cxn ang="0">
+                <a:pos x="connsiteX1" y="connsiteY1"/>
+              </a:cxn>
+              <a:cxn ang="0">
+                <a:pos x="connsiteX2" y="connsiteY2"/>
+              </a:cxn>
+              <a:cxn ang="0">
+                <a:pos x="connsiteX3" y="connsiteY3"/>
+              </a:cxn>
+              <a:cxn ang="0">
+                <a:pos x="connsiteX4" y="connsiteY4"/>
+              </a:cxn>
+              <a:cxn ang="0">
+                <a:pos x="connsiteX5" y="connsiteY5"/>
+              </a:cxn>
+              <a:cxn ang="0">
+                <a:pos x="connsiteX6" y="connsiteY6"/>
+              </a:cxn>
+              <a:cxn ang="0">
+                <a:pos x="connsiteX7" y="connsiteY7"/>
+              </a:cxn>
+              <a:cxn ang="0">
+                <a:pos x="connsiteX8" y="connsiteY8"/>
+              </a:cxn>
+            </a:cxnLst>
+            <a:rect l="l" t="t" r="r" b="b"/>
+            <a:pathLst>
+              <a:path w="3900357" h="4178958">
+                <a:moveTo>
+                  <a:pt x="2432225" y="93939"/>
+                </a:moveTo>
+                <a:cubicBezTo>
+                  <a:pt x="3282786" y="358491"/>
+                  <a:pt x="3900357" y="1151865"/>
+                  <a:pt x="3900357" y="2089479"/>
+                </a:cubicBezTo>
+                <a:cubicBezTo>
+                  <a:pt x="3900357" y="3243466"/>
+                  <a:pt x="2964865" y="4178958"/>
+                  <a:pt x="1810878" y="4178958"/>
+                </a:cubicBezTo>
+                <a:cubicBezTo>
+                  <a:pt x="1089636" y="4178958"/>
+                  <a:pt x="453744" y="3813531"/>
+                  <a:pt x="78249" y="3257727"/>
+                </a:cubicBezTo>
+                <a:lnTo>
+                  <a:pt x="0" y="3128923"/>
+                </a:lnTo>
+                <a:lnTo>
+                  <a:pt x="831324" y="244281"/>
+                </a:lnTo>
+                <a:lnTo>
+                  <a:pt x="997559" y="164202"/>
+                </a:lnTo>
+                <a:cubicBezTo>
+                  <a:pt x="1247540" y="58468"/>
+                  <a:pt x="1522381" y="0"/>
+                  <a:pt x="1810878" y="0"/>
+                </a:cubicBezTo>
+                <a:cubicBezTo>
+                  <a:pt x="2027251" y="0"/>
+                  <a:pt x="2235942" y="32888"/>
+                  <a:pt x="2432225" y="93939"/>
+                </a:cubicBezTo>
+                <a:close/>
+              </a:path>
+            </a:pathLst>
+          </a:custGeom>
+          <a:gradFill>
+            <a:gsLst>
+              <a:gs pos="29000">
+                <a:srgbClr val="000000">
+                  <a:alpha val="0"/>
+                </a:srgbClr>
+              </a:gs>
+              <a:gs pos="100000">
+                <a:schemeClr val="accent1">
+                  <a:alpha val="43000"/>
+                </a:schemeClr>
+              </a:gs>
+            </a:gsLst>
+            <a:lin ang="1800000" scaled="0"/>
+          </a:gradFill>
+          <a:ln>
+            <a:noFill/>
+          </a:ln>
+        </p:spPr>
+        <p:style>
+          <a:lnRef idx="2">
+            <a:schemeClr val="accent1">
+              <a:shade val="50000"/>
+            </a:schemeClr>
+          </a:lnRef>
+          <a:fillRef idx="1">
+            <a:schemeClr val="accent1"/>
+          </a:fillRef>
+          <a:effectRef idx="0">
+            <a:schemeClr val="accent1"/>
+          </a:effectRef>
+          <a:fontRef idx="minor">
+            <a:schemeClr val="lt1"/>
+          </a:fontRef>
+        </p:style>
+        <p:txBody>
+          <a:bodyPr wrap="square" rtlCol="0" anchor="ctr">
+            <a:noAutofit/>
+          </a:bodyPr>
+          <a:lstStyle/>
+          <a:p>
+            <a:pPr algn="ctr"/>
+            <a:endParaRPr lang="en-US" dirty="0"/>
+          </a:p>
+        </p:txBody>
+      </p:sp>
+      <p:sp>
+        <p:nvSpPr>
+          <p:cNvPr id="20" name="Rectangle 19">
+            <a:extLst>
+              <a:ext uri="{FF2B5EF4-FFF2-40B4-BE49-F238E27FC236}">
+                <a16:creationId xmlns:a16="http://schemas.microsoft.com/office/drawing/2014/main" id="{8D71EDA1-87BF-4D5D-AB79-F346FD19278A}"/>
+              </a:ext>
+              <a:ext uri="{C183D7F6-B498-43B3-948B-1728B52AA6E4}">
+                <adec:decorative xmlns:adec="http://schemas.microsoft.com/office/drawing/2017/decorative" val="1"/>
+              </a:ext>
+            </a:extLst>
+          </p:cNvPr>
+          <p:cNvSpPr>
+            <a:spLocks noGrp="1" noRot="1" noChangeAspect="1" noMove="1" noResize="1" noEditPoints="1" noAdjustHandles="1" noChangeArrowheads="1" noChangeShapeType="1" noTextEdit="1"/>
+          </p:cNvSpPr>
+          <p:nvPr>
+            <p:extLst>
+              <p:ext uri="{386F3935-93C4-4BCD-93E2-E3B085C9AB24}">
+                <p16:designElem xmlns:p16="http://schemas.microsoft.com/office/powerpoint/2015/main" val="1"/>
+              </p:ext>
+            </p:extLst>
+          </p:nvPr>
+        </p:nvSpPr>
+        <p:spPr>
+          <a:xfrm rot="5400000" flipH="1">
+            <a:off x="-1410093" y="1399943"/>
+            <a:ext cx="6858003" cy="4037835"/>
+          </a:xfrm>
+          <a:prstGeom prst="rect">
+            <a:avLst/>
+          </a:prstGeom>
+          <a:gradFill>
+            <a:gsLst>
+              <a:gs pos="0">
+                <a:srgbClr val="000000">
+                  <a:alpha val="0"/>
+                </a:srgbClr>
+              </a:gs>
+              <a:gs pos="99000">
+                <a:schemeClr val="accent1">
+                  <a:lumMod val="60000"/>
+                  <a:lumOff val="40000"/>
+                  <a:alpha val="11000"/>
+                </a:schemeClr>
+              </a:gs>
+            </a:gsLst>
+            <a:lin ang="7200000" scaled="0"/>
+          </a:gradFill>
+          <a:ln>
+            <a:noFill/>
+          </a:ln>
+        </p:spPr>
+        <p:style>
+          <a:lnRef idx="2">
+            <a:schemeClr val="accent1">
+              <a:shade val="50000"/>
+            </a:schemeClr>
+          </a:lnRef>
+          <a:fillRef idx="1">
+            <a:schemeClr val="accent1"/>
+          </a:fillRef>
+          <a:effectRef idx="0">
+            <a:schemeClr val="accent1"/>
+          </a:effectRef>
+          <a:fontRef idx="minor">
+            <a:schemeClr val="lt1"/>
+          </a:fontRef>
+        </p:style>
+        <p:txBody>
+          <a:bodyPr rtlCol="0" anchor="ctr"/>
+          <a:lstStyle/>
+          <a:p>
+            <a:pPr algn="ctr"/>
+            <a:endParaRPr lang="en-US"/>
+          </a:p>
+        </p:txBody>
+      </p:sp>
       <p:sp>
         <p:nvSpPr>
           <p:cNvPr id="2" name="Title 1">
@@ -3902,14 +5383,29 @@
             <p:ph type="ctrTitle"/>
           </p:nvPr>
         </p:nvSpPr>
-        <p:spPr/>
-        <p:txBody>
-          <a:bodyPr/>
-          <a:lstStyle/>
-          <a:p>
-            <a:r>
-              <a:rPr lang="en-US" dirty="0"/>
-              <a:t>Schedule</a:t>
+        <p:spPr>
+          <a:xfrm>
+            <a:off x="466722" y="586855"/>
+            <a:ext cx="3201366" cy="3387497"/>
+          </a:xfrm>
+        </p:spPr>
+        <p:txBody>
+          <a:bodyPr vert="horz" lIns="91440" tIns="45720" rIns="91440" bIns="45720" rtlCol="0" anchor="b">
+            <a:normAutofit/>
+          </a:bodyPr>
+          <a:lstStyle/>
+          <a:p>
+            <a:pPr algn="r"/>
+            <a:r>
+              <a:rPr lang="en-US" sz="4000" kern="1200">
+                <a:solidFill>
+                  <a:srgbClr val="FFFFFF"/>
+                </a:solidFill>
+                <a:latin typeface="+mj-lt"/>
+                <a:ea typeface="+mj-ea"/>
+                <a:cs typeface="+mj-cs"/>
+              </a:rPr>
+              <a:t>Risks</a:t>
             </a:r>
           </a:p>
         </p:txBody>
@@ -3930,12 +5426,104 @@
             <p:ph type="subTitle" idx="1"/>
           </p:nvPr>
         </p:nvSpPr>
-        <p:spPr/>
-        <p:txBody>
-          <a:bodyPr/>
-          <a:lstStyle/>
-          <a:p>
-            <a:endParaRPr lang="en-US"/>
+        <p:spPr>
+          <a:xfrm>
+            <a:off x="4810259" y="649480"/>
+            <a:ext cx="6555347" cy="5546047"/>
+          </a:xfrm>
+        </p:spPr>
+        <p:txBody>
+          <a:bodyPr vert="horz" lIns="91440" tIns="45720" rIns="91440" bIns="45720" rtlCol="0" anchor="ctr">
+            <a:normAutofit/>
+          </a:bodyPr>
+          <a:lstStyle/>
+          <a:p>
+            <a:pPr indent="-228600" algn="l">
+              <a:buFont typeface="Arial" panose="020B0604020202020204" pitchFamily="34" charset="0"/>
+              <a:buChar char="•"/>
+            </a:pPr>
+            <a:r>
+              <a:rPr lang="en-US" sz="2000" dirty="0"/>
+              <a:t>Project Risks:</a:t>
+            </a:r>
+          </a:p>
+          <a:p>
+            <a:pPr marL="342900" indent="-228600" algn="l">
+              <a:buFont typeface="Arial" panose="020B0604020202020204" pitchFamily="34" charset="0"/>
+              <a:buChar char="•"/>
+            </a:pPr>
+            <a:r>
+              <a:rPr lang="en-US" sz="2000" dirty="0"/>
+              <a:t>Over scope due to the number of features.</a:t>
+            </a:r>
+          </a:p>
+          <a:p>
+            <a:pPr marL="800100" lvl="1" indent="-228600" algn="l">
+              <a:buFont typeface="Arial" panose="020B0604020202020204" pitchFamily="34" charset="0"/>
+              <a:buChar char="•"/>
+            </a:pPr>
+            <a:r>
+              <a:rPr lang="en-US" sz="1600" dirty="0"/>
+              <a:t>Must cut down or revise features </a:t>
+            </a:r>
+          </a:p>
+          <a:p>
+            <a:pPr marL="342900" indent="-228600" algn="l">
+              <a:buFont typeface="Arial" panose="020B0604020202020204" pitchFamily="34" charset="0"/>
+              <a:buChar char="•"/>
+            </a:pPr>
+            <a:r>
+              <a:rPr lang="en-US" sz="2000" dirty="0"/>
+              <a:t>Loss in game direction</a:t>
+            </a:r>
+          </a:p>
+          <a:p>
+            <a:pPr marL="800100" lvl="1" indent="-228600" algn="l">
+              <a:buFont typeface="Arial" panose="020B0604020202020204" pitchFamily="34" charset="0"/>
+              <a:buChar char="•"/>
+            </a:pPr>
+            <a:r>
+              <a:rPr lang="en-US" sz="1600" dirty="0"/>
+              <a:t>Narrative is not clear where the story is going</a:t>
+            </a:r>
+          </a:p>
+          <a:p>
+            <a:pPr marL="800100" lvl="1" indent="-228600" algn="l">
+              <a:buFont typeface="Arial" panose="020B0604020202020204" pitchFamily="34" charset="0"/>
+              <a:buChar char="•"/>
+            </a:pPr>
+            <a:r>
+              <a:rPr lang="en-US" sz="1600" dirty="0"/>
+              <a:t>Conflicting game directions for different features</a:t>
+            </a:r>
+          </a:p>
+          <a:p>
+            <a:pPr marL="342900" indent="-228600" algn="l">
+              <a:buFont typeface="Arial" panose="020B0604020202020204" pitchFamily="34" charset="0"/>
+              <a:buChar char="•"/>
+            </a:pPr>
+            <a:r>
+              <a:rPr lang="en-US" sz="2000" dirty="0"/>
+              <a:t>Balancing issues to the games management </a:t>
+            </a:r>
+            <a:r>
+              <a:rPr lang="en-US" sz="2000"/>
+              <a:t>mechanics.</a:t>
+            </a:r>
+          </a:p>
+          <a:p>
+            <a:pPr marL="800100" lvl="1" indent="-228600" algn="l">
+              <a:buFont typeface="Arial" panose="020B0604020202020204" pitchFamily="34" charset="0"/>
+              <a:buChar char="•"/>
+            </a:pPr>
+            <a:endParaRPr lang="en-US" sz="1600" dirty="0"/>
+          </a:p>
+          <a:p>
+            <a:pPr indent="-228600" algn="l">
+              <a:buFont typeface="Arial" panose="020B0604020202020204" pitchFamily="34" charset="0"/>
+              <a:buChar char="•"/>
+            </a:pPr>
+            <a:endParaRPr lang="en-US" sz="2000" dirty="0"/>
           </a:p>
         </p:txBody>
       </p:sp>
@@ -3952,10 +5540,198 @@
 </p:sld>
 </file>
 
+<file path=ppt/slides/slide8.xml><?xml version="1.0" encoding="utf-8"?>
+<p:sld xmlns:a="http://schemas.openxmlformats.org/drawingml/2006/main" xmlns:r="http://schemas.openxmlformats.org/officeDocument/2006/relationships" xmlns:p="http://schemas.openxmlformats.org/presentationml/2006/main">
+  <p:cSld>
+    <p:spTree>
+      <p:nvGrpSpPr>
+        <p:cNvPr id="1" name="">
+          <a:extLst>
+            <a:ext uri="{FF2B5EF4-FFF2-40B4-BE49-F238E27FC236}">
+              <a16:creationId xmlns:a16="http://schemas.microsoft.com/office/drawing/2014/main" id="{BD1200CD-62A0-EB8F-9225-86A63C1AA762}"/>
+            </a:ext>
+          </a:extLst>
+        </p:cNvPr>
+        <p:cNvGrpSpPr/>
+        <p:nvPr/>
+      </p:nvGrpSpPr>
+      <p:grpSpPr>
+        <a:xfrm>
+          <a:off x="0" y="0"/>
+          <a:ext cx="0" cy="0"/>
+          <a:chOff x="0" y="0"/>
+          <a:chExt cx="0" cy="0"/>
+        </a:xfrm>
+      </p:grpSpPr>
+      <p:sp>
+        <p:nvSpPr>
+          <p:cNvPr id="2" name="Title 1">
+            <a:extLst>
+              <a:ext uri="{FF2B5EF4-FFF2-40B4-BE49-F238E27FC236}">
+                <a16:creationId xmlns:a16="http://schemas.microsoft.com/office/drawing/2014/main" id="{09CAF329-7965-C0A1-1F60-E92E5C159B9E}"/>
+              </a:ext>
+            </a:extLst>
+          </p:cNvPr>
+          <p:cNvSpPr>
+            <a:spLocks noGrp="1"/>
+          </p:cNvSpPr>
+          <p:nvPr>
+            <p:ph type="ctrTitle"/>
+          </p:nvPr>
+        </p:nvSpPr>
+        <p:spPr>
+          <a:xfrm>
+            <a:off x="1524000" y="200470"/>
+            <a:ext cx="9144000" cy="937768"/>
+          </a:xfrm>
+        </p:spPr>
+        <p:txBody>
+          <a:bodyPr/>
+          <a:lstStyle/>
+          <a:p>
+            <a:r>
+              <a:rPr lang="en-US" dirty="0"/>
+              <a:t>PoC Demo</a:t>
+            </a:r>
+          </a:p>
+        </p:txBody>
+      </p:sp>
+      <p:sp>
+        <p:nvSpPr>
+          <p:cNvPr id="3" name="Subtitle 2">
+            <a:extLst>
+              <a:ext uri="{FF2B5EF4-FFF2-40B4-BE49-F238E27FC236}">
+                <a16:creationId xmlns:a16="http://schemas.microsoft.com/office/drawing/2014/main" id="{80323DE9-387A-375A-0A36-D110AB2FBA30}"/>
+              </a:ext>
+            </a:extLst>
+          </p:cNvPr>
+          <p:cNvSpPr>
+            <a:spLocks noGrp="1"/>
+          </p:cNvSpPr>
+          <p:nvPr>
+            <p:ph type="subTitle" idx="1"/>
+          </p:nvPr>
+        </p:nvSpPr>
+        <p:spPr/>
+        <p:txBody>
+          <a:bodyPr/>
+          <a:lstStyle/>
+          <a:p>
+            <a:endParaRPr lang="en-US" dirty="0"/>
+          </a:p>
+        </p:txBody>
+      </p:sp>
+    </p:spTree>
+    <p:extLst>
+      <p:ext uri="{BB962C8B-B14F-4D97-AF65-F5344CB8AC3E}">
+        <p14:creationId xmlns:p14="http://schemas.microsoft.com/office/powerpoint/2010/main" val="582310933"/>
+      </p:ext>
+    </p:extLst>
+  </p:cSld>
+  <p:clrMapOvr>
+    <a:masterClrMapping/>
+  </p:clrMapOvr>
+</p:sld>
+</file>
+
+<file path=ppt/slides/slide9.xml><?xml version="1.0" encoding="utf-8"?>
+<p:sld xmlns:a="http://schemas.openxmlformats.org/drawingml/2006/main" xmlns:r="http://schemas.openxmlformats.org/officeDocument/2006/relationships" xmlns:p="http://schemas.openxmlformats.org/presentationml/2006/main">
+  <p:cSld>
+    <p:spTree>
+      <p:nvGrpSpPr>
+        <p:cNvPr id="1" name="">
+          <a:extLst>
+            <a:ext uri="{FF2B5EF4-FFF2-40B4-BE49-F238E27FC236}">
+              <a16:creationId xmlns:a16="http://schemas.microsoft.com/office/drawing/2014/main" id="{1A053C0C-06C4-0A1E-BB98-A75F3F5FF346}"/>
+            </a:ext>
+          </a:extLst>
+        </p:cNvPr>
+        <p:cNvGrpSpPr/>
+        <p:nvPr/>
+      </p:nvGrpSpPr>
+      <p:grpSpPr>
+        <a:xfrm>
+          <a:off x="0" y="0"/>
+          <a:ext cx="0" cy="0"/>
+          <a:chOff x="0" y="0"/>
+          <a:chExt cx="0" cy="0"/>
+        </a:xfrm>
+      </p:grpSpPr>
+      <p:sp>
+        <p:nvSpPr>
+          <p:cNvPr id="2" name="Title 1">
+            <a:extLst>
+              <a:ext uri="{FF2B5EF4-FFF2-40B4-BE49-F238E27FC236}">
+                <a16:creationId xmlns:a16="http://schemas.microsoft.com/office/drawing/2014/main" id="{42ECED29-270F-396E-EB45-11213B7F209C}"/>
+              </a:ext>
+            </a:extLst>
+          </p:cNvPr>
+          <p:cNvSpPr>
+            <a:spLocks noGrp="1"/>
+          </p:cNvSpPr>
+          <p:nvPr>
+            <p:ph type="ctrTitle"/>
+          </p:nvPr>
+        </p:nvSpPr>
+        <p:spPr>
+          <a:xfrm>
+            <a:off x="1524000" y="210311"/>
+            <a:ext cx="9144000" cy="1086803"/>
+          </a:xfrm>
+        </p:spPr>
+        <p:txBody>
+          <a:bodyPr/>
+          <a:lstStyle/>
+          <a:p>
+            <a:r>
+              <a:rPr lang="en-US" dirty="0"/>
+              <a:t>Prototyping validation results</a:t>
+            </a:r>
+          </a:p>
+        </p:txBody>
+      </p:sp>
+      <p:sp>
+        <p:nvSpPr>
+          <p:cNvPr id="3" name="Subtitle 2">
+            <a:extLst>
+              <a:ext uri="{FF2B5EF4-FFF2-40B4-BE49-F238E27FC236}">
+                <a16:creationId xmlns:a16="http://schemas.microsoft.com/office/drawing/2014/main" id="{32085A02-E6C7-1230-9E30-B69E1AC46F3B}"/>
+              </a:ext>
+            </a:extLst>
+          </p:cNvPr>
+          <p:cNvSpPr>
+            <a:spLocks noGrp="1"/>
+          </p:cNvSpPr>
+          <p:nvPr>
+            <p:ph type="subTitle" idx="1"/>
+          </p:nvPr>
+        </p:nvSpPr>
+        <p:spPr/>
+        <p:txBody>
+          <a:bodyPr/>
+          <a:lstStyle/>
+          <a:p>
+            <a:endParaRPr lang="en-US"/>
+          </a:p>
+        </p:txBody>
+      </p:sp>
+    </p:spTree>
+    <p:extLst>
+      <p:ext uri="{BB962C8B-B14F-4D97-AF65-F5344CB8AC3E}">
+        <p14:creationId xmlns:p14="http://schemas.microsoft.com/office/powerpoint/2010/main" val="1552163749"/>
+      </p:ext>
+    </p:extLst>
+  </p:cSld>
+  <p:clrMapOvr>
+    <a:masterClrMapping/>
+  </p:clrMapOvr>
+</p:sld>
+</file>
+
 <file path=ppt/theme/theme1.xml><?xml version="1.0" encoding="utf-8"?>
 <a:theme xmlns:a="http://schemas.openxmlformats.org/drawingml/2006/main" name="Office Theme">
   <a:themeElements>
-    <a:clrScheme name="Office">
+    <a:clrScheme name="Office Theme">
       <a:dk1>
         <a:sysClr val="windowText" lastClr="000000"/>
       </a:dk1>
@@ -3987,13 +5763,13 @@
         <a:srgbClr val="4EA72E"/>
       </a:accent6>
       <a:hlink>
-        <a:srgbClr val="467886"/>
+        <a:srgbClr val="538D9D"/>
       </a:hlink>
       <a:folHlink>
-        <a:srgbClr val="96607D"/>
+        <a:srgbClr val="A5738E"/>
       </a:folHlink>
     </a:clrScheme>
-    <a:fontScheme name="Office">
+    <a:fontScheme name="Office Theme">
       <a:majorFont>
         <a:latin typeface="Aptos Display" panose="02110004020202020204"/>
         <a:ea typeface=""/>
@@ -4099,7 +5875,7 @@
         <a:font script="Tfng" typeface="Ebrima"/>
       </a:minorFont>
     </a:fontScheme>
-    <a:fmtScheme name="Office">
+    <a:fmtScheme name="Office Theme">
       <a:fillStyleLst>
         <a:solidFill>
           <a:schemeClr val="phClr"/>
@@ -4261,13 +6037,22 @@
   <a:extraClrSchemeLst/>
   <a:extLst>
     <a:ext uri="{05A4C25C-085E-4340-85A3-A5531E510DB2}">
-      <thm15:themeFamily xmlns:thm15="http://schemas.microsoft.com/office/thememl/2012/main" name="Office Theme" id="{2E142A2C-CD16-42D6-873A-C26D2A0506FA}" vid="{1BDDFF52-6CD6-40A5-AB3C-68EB2F1E4D0A}"/>
+      <thm15:themeFamily xmlns:thm15="http://schemas.microsoft.com/office/thememl/2012/main" name="Office Theme" id="{2E142A2C-CD16-42D6-873A-C26D2A0506FA}" vid="{3A418E6B-C5F0-4B95-8D77-61E3EF3B5DF5}"/>
     </a:ext>
   </a:extLst>
 </a:theme>
 </file>
 
 <file path=customXml/item1.xml><?xml version="1.0" encoding="utf-8"?>
+<?mso-contentType ?>
+<FormTemplates xmlns="http://schemas.microsoft.com/sharepoint/v3/contenttype/forms">
+  <Display>DocumentLibraryForm</Display>
+  <Edit>DocumentLibraryForm</Edit>
+  <New>DocumentLibraryForm</New>
+</FormTemplates>
+</file>
+
+<file path=customXml/item2.xml><?xml version="1.0" encoding="utf-8"?>
 <ct:contentTypeSchema xmlns:ct="http://schemas.microsoft.com/office/2006/metadata/contentType" xmlns:ma="http://schemas.microsoft.com/office/2006/metadata/properties/metaAttributes" ct:_="" ma:_="" ma:contentTypeName="Document" ma:contentTypeID="0x010100EB9F34A24037AB4FA470085E68A4B53B" ma:contentTypeVersion="14" ma:contentTypeDescription="Create a new document." ma:contentTypeScope="" ma:versionID="d1c46f83f753af91e9f236372aa3fba8">
   <xsd:schema xmlns:xsd="http://www.w3.org/2001/XMLSchema" xmlns:xs="http://www.w3.org/2001/XMLSchema" xmlns:p="http://schemas.microsoft.com/office/2006/metadata/properties" xmlns:ns3="97dd5345-e793-494f-a61a-0ff5f2d8588d" xmlns:ns4="72e2bb9d-dac6-4618-b85f-5ec835598a0c" targetNamespace="http://schemas.microsoft.com/office/2006/metadata/properties" ma:root="true" ma:fieldsID="da0ca4c5c196f4d5263a181ab1aa034e" ns3:_="" ns4:_="">
     <xsd:import namespace="97dd5345-e793-494f-a61a-0ff5f2d8588d"/>
@@ -4494,15 +6279,6 @@
 </ct:contentTypeSchema>
 </file>
 
-<file path=customXml/item2.xml><?xml version="1.0" encoding="utf-8"?>
-<?mso-contentType ?>
-<FormTemplates xmlns="http://schemas.microsoft.com/sharepoint/v3/contenttype/forms">
-  <Display>DocumentLibraryForm</Display>
-  <Edit>DocumentLibraryForm</Edit>
-  <New>DocumentLibraryForm</New>
-</FormTemplates>
-</file>
-
 <file path=customXml/item3.xml><?xml version="1.0" encoding="utf-8"?>
 <p:properties xmlns:p="http://schemas.microsoft.com/office/2006/metadata/properties" xmlns:xsi="http://www.w3.org/2001/XMLSchema-instance" xmlns:pc="http://schemas.microsoft.com/office/infopath/2007/PartnerControls">
   <documentManagement>
@@ -4512,6 +6288,14 @@
 </file>
 
 <file path=customXml/itemProps1.xml><?xml version="1.0" encoding="utf-8"?>
+<ds:datastoreItem xmlns:ds="http://schemas.openxmlformats.org/officeDocument/2006/customXml" ds:itemID="{927B924B-2206-428C-8F4F-4534AD1F44FF}">
+  <ds:schemaRefs>
+    <ds:schemaRef ds:uri="http://schemas.microsoft.com/sharepoint/v3/contenttype/forms"/>
+  </ds:schemaRefs>
+</ds:datastoreItem>
+</file>
+
+<file path=customXml/itemProps2.xml><?xml version="1.0" encoding="utf-8"?>
 <ds:datastoreItem xmlns:ds="http://schemas.openxmlformats.org/officeDocument/2006/customXml" ds:itemID="{FEE4CA47-79D6-4822-8C26-756BB9B9B0BB}">
   <ds:schemaRefs>
     <ds:schemaRef ds:uri="http://schemas.microsoft.com/office/2006/metadata/contentType"/>
@@ -4530,27 +6314,19 @@
 </ds:datastoreItem>
 </file>
 
-<file path=customXml/itemProps2.xml><?xml version="1.0" encoding="utf-8"?>
-<ds:datastoreItem xmlns:ds="http://schemas.openxmlformats.org/officeDocument/2006/customXml" ds:itemID="{927B924B-2206-428C-8F4F-4534AD1F44FF}">
-  <ds:schemaRefs>
-    <ds:schemaRef ds:uri="http://schemas.microsoft.com/sharepoint/v3/contenttype/forms"/>
-  </ds:schemaRefs>
-</ds:datastoreItem>
-</file>
-
 <file path=customXml/itemProps3.xml><?xml version="1.0" encoding="utf-8"?>
 <ds:datastoreItem xmlns:ds="http://schemas.openxmlformats.org/officeDocument/2006/customXml" ds:itemID="{C4BD7C07-57AF-401E-8F88-93613B698CD0}">
   <ds:schemaRefs>
+    <ds:schemaRef ds:uri="http://schemas.microsoft.com/office/infopath/2007/PartnerControls"/>
     <ds:schemaRef ds:uri="http://purl.org/dc/elements/1.1/"/>
+    <ds:schemaRef ds:uri="http://purl.org/dc/terms/"/>
+    <ds:schemaRef ds:uri="97dd5345-e793-494f-a61a-0ff5f2d8588d"/>
     <ds:schemaRef ds:uri="http://www.w3.org/XML/1998/namespace"/>
-    <ds:schemaRef ds:uri="http://purl.org/dc/terms/"/>
+    <ds:schemaRef ds:uri="http://schemas.microsoft.com/office/2006/documentManagement/types"/>
+    <ds:schemaRef ds:uri="http://purl.org/dc/dcmitype/"/>
+    <ds:schemaRef ds:uri="http://schemas.microsoft.com/office/2006/metadata/properties"/>
+    <ds:schemaRef ds:uri="http://schemas.openxmlformats.org/package/2006/metadata/core-properties"/>
     <ds:schemaRef ds:uri="72e2bb9d-dac6-4618-b85f-5ec835598a0c"/>
-    <ds:schemaRef ds:uri="http://schemas.microsoft.com/office/2006/metadata/properties"/>
-    <ds:schemaRef ds:uri="97dd5345-e793-494f-a61a-0ff5f2d8588d"/>
-    <ds:schemaRef ds:uri="http://purl.org/dc/dcmitype/"/>
-    <ds:schemaRef ds:uri="http://schemas.microsoft.com/office/2006/documentManagement/types"/>
-    <ds:schemaRef ds:uri="http://schemas.microsoft.com/office/infopath/2007/PartnerControls"/>
-    <ds:schemaRef ds:uri="http://schemas.openxmlformats.org/package/2006/metadata/core-properties"/>
   </ds:schemaRefs>
 </ds:datastoreItem>
 </file>
</xml_diff>